<commit_message>
final code and presentation
</commit_message>
<xml_diff>
--- a/week 5/Ex5 presentation Sarit and Itamar.pptx
+++ b/week 5/Ex5 presentation Sarit and Itamar.pptx
@@ -5,13 +5,17 @@
     <p:sldMasterId id="2147483648" r:id="rId1"/>
   </p:sldMasterIdLst>
   <p:notesMasterIdLst>
-    <p:notesMasterId r:id="rId6"/>
+    <p:notesMasterId r:id="rId10"/>
   </p:notesMasterIdLst>
   <p:sldIdLst>
     <p:sldId id="256" r:id="rId2"/>
     <p:sldId id="258" r:id="rId3"/>
     <p:sldId id="259" r:id="rId4"/>
     <p:sldId id="260" r:id="rId5"/>
+    <p:sldId id="262" r:id="rId6"/>
+    <p:sldId id="263" r:id="rId7"/>
+    <p:sldId id="264" r:id="rId8"/>
+    <p:sldId id="261" r:id="rId9"/>
   </p:sldIdLst>
   <p:sldSz cx="12192000" cy="6858000"/>
   <p:notesSz cx="6858000" cy="9144000"/>
@@ -110,6 +114,11 @@
       </a:defRPr>
     </a:lvl9pPr>
   </p:defaultTextStyle>
+  <p:extLst>
+    <p:ext uri="{EFAFB233-063F-42B5-8137-9DF3F51BA10A}">
+      <p15:sldGuideLst xmlns:p15="http://schemas.microsoft.com/office/powerpoint/2012/main"/>
+    </p:ext>
+  </p:extLst>
 </p:presentation>
 </file>
 
@@ -4476,7 +4485,7 @@
                 <a:ea typeface="+mn-ea"/>
                 <a:cs typeface="+mn-cs"/>
               </a:rPr>
-              <a:t>Modelling a population</a:t>
+              <a:t>The Model</a:t>
             </a:r>
             <a:endParaRPr lang="en-US" dirty="0"/>
           </a:p>
@@ -4887,12 +4896,61 @@
           <a:chExt cx="0" cy="0"/>
         </a:xfrm>
       </p:grpSpPr>
+      <p:sp>
+        <p:nvSpPr>
+          <p:cNvPr id="2" name="Title 1">
+            <a:extLst>
+              <a:ext uri="{FF2B5EF4-FFF2-40B4-BE49-F238E27FC236}">
+                <a16:creationId xmlns:a16="http://schemas.microsoft.com/office/drawing/2014/main" id="{13E90765-7B43-DE89-4081-2EBA146583F2}"/>
+              </a:ext>
+            </a:extLst>
+          </p:cNvPr>
+          <p:cNvSpPr>
+            <a:spLocks noGrp="1"/>
+          </p:cNvSpPr>
+          <p:nvPr>
+            <p:ph type="title"/>
+          </p:nvPr>
+        </p:nvSpPr>
+        <p:spPr>
+          <a:xfrm>
+            <a:off x="838200" y="365125"/>
+            <a:ext cx="10515600" cy="1325563"/>
+          </a:xfrm>
+        </p:spPr>
+        <p:txBody>
+          <a:bodyPr/>
+          <a:lstStyle/>
+          <a:p>
+            <a:pPr algn="ctr" rtl="0"/>
+            <a:r>
+              <a:rPr lang="en-US" dirty="0">
+                <a:solidFill>
+                  <a:srgbClr val="0070C0"/>
+                </a:solidFill>
+                <a:effectLst>
+                  <a:outerShdw blurRad="38100" dist="38100" dir="2700000" algn="tl">
+                    <a:srgbClr val="000000">
+                      <a:alpha val="43137"/>
+                    </a:srgbClr>
+                  </a:outerShdw>
+                </a:effectLst>
+                <a:latin typeface="Comic Sans MS" panose="030F0702030302020204" pitchFamily="66" charset="0"/>
+                <a:ea typeface="+mn-ea"/>
+                <a:cs typeface="+mn-cs"/>
+              </a:rPr>
+              <a:t>Time to convergence is shorted with more mutations per genome</a:t>
+            </a:r>
+            <a:endParaRPr lang="en-US" dirty="0"/>
+          </a:p>
+        </p:txBody>
+      </p:sp>
       <p:pic>
         <p:nvPicPr>
-          <p:cNvPr id="4" name="תמונה 3">
-            <a:extLst>
-              <a:ext uri="{FF2B5EF4-FFF2-40B4-BE49-F238E27FC236}">
-                <a16:creationId xmlns:a16="http://schemas.microsoft.com/office/drawing/2014/main" id="{EBAAB2DF-0107-B1A0-29E5-04CC5ED5E4C1}"/>
+          <p:cNvPr id="5" name="תמונה 4" descr="תמונה שמכילה טקסט, קו, עלילה, צילום מסך&#10;&#10;תוכן שנוצר על-ידי בינה מלאכותית עשוי להיות שגוי.">
+            <a:extLst>
+              <a:ext uri="{FF2B5EF4-FFF2-40B4-BE49-F238E27FC236}">
+                <a16:creationId xmlns:a16="http://schemas.microsoft.com/office/drawing/2014/main" id="{68E258CB-3D18-5653-6EF7-FAA9728FEC69}"/>
               </a:ext>
             </a:extLst>
           </p:cNvPr>
@@ -4909,25 +4967,58 @@
               </a:ext>
             </a:extLst>
           </a:blip>
-          <a:srcRect/>
           <a:stretch>
             <a:fillRect/>
           </a:stretch>
         </p:blipFill>
-        <p:spPr bwMode="auto">
+        <p:spPr>
           <a:xfrm>
-            <a:off x="3560762" y="1844675"/>
-            <a:ext cx="5070475" cy="3168650"/>
+            <a:off x="2235851" y="1690688"/>
+            <a:ext cx="7720298" cy="4825186"/>
           </a:xfrm>
           <a:prstGeom prst="rect">
             <a:avLst/>
           </a:prstGeom>
-          <a:noFill/>
-          <a:ln>
-            <a:noFill/>
-          </a:ln>
         </p:spPr>
       </p:pic>
+      <p:sp>
+        <p:nvSpPr>
+          <p:cNvPr id="6" name="Content Placeholder 2">
+            <a:extLst>
+              <a:ext uri="{FF2B5EF4-FFF2-40B4-BE49-F238E27FC236}">
+                <a16:creationId xmlns:a16="http://schemas.microsoft.com/office/drawing/2014/main" id="{7F49B0B0-4795-413F-2206-E16559337DF9}"/>
+              </a:ext>
+            </a:extLst>
+          </p:cNvPr>
+          <p:cNvSpPr>
+            <a:spLocks noGrp="1"/>
+          </p:cNvSpPr>
+          <p:nvPr>
+            <p:ph idx="1"/>
+          </p:nvPr>
+        </p:nvSpPr>
+        <p:spPr>
+          <a:xfrm>
+            <a:off x="10814255" y="6274978"/>
+            <a:ext cx="1079090" cy="435794"/>
+          </a:xfrm>
+        </p:spPr>
+        <p:txBody>
+          <a:bodyPr>
+            <a:normAutofit fontScale="77500" lnSpcReduction="20000"/>
+          </a:bodyPr>
+          <a:lstStyle/>
+          <a:p>
+            <a:pPr marL="0" indent="0" algn="l" rtl="0">
+              <a:buNone/>
+            </a:pPr>
+            <a:r>
+              <a:rPr lang="en-US" sz="3200" b="1" i="1" dirty="0"/>
+              <a:t>Len=5</a:t>
+            </a:r>
+          </a:p>
+        </p:txBody>
+      </p:sp>
     </p:spTree>
     <p:extLst>
       <p:ext uri="{BB962C8B-B14F-4D97-AF65-F5344CB8AC3E}">
@@ -4938,6 +5029,88 @@
   <p:clrMapOvr>
     <a:masterClrMapping/>
   </p:clrMapOvr>
+  <p:timing>
+    <p:tnLst>
+      <p:par>
+        <p:cTn id="1" dur="indefinite" restart="never" nodeType="tmRoot">
+          <p:childTnLst>
+            <p:seq concurrent="1" nextAc="seek">
+              <p:cTn id="2" dur="indefinite" nodeType="mainSeq">
+                <p:childTnLst>
+                  <p:par>
+                    <p:cTn id="3" fill="hold">
+                      <p:stCondLst>
+                        <p:cond delay="indefinite"/>
+                      </p:stCondLst>
+                      <p:childTnLst>
+                        <p:par>
+                          <p:cTn id="4" fill="hold">
+                            <p:stCondLst>
+                              <p:cond delay="0"/>
+                            </p:stCondLst>
+                            <p:childTnLst>
+                              <p:par>
+                                <p:cTn id="5" presetID="1" presetClass="entr" presetSubtype="0" fill="hold" grpId="0" nodeType="clickEffect">
+                                  <p:stCondLst>
+                                    <p:cond delay="0"/>
+                                  </p:stCondLst>
+                                  <p:childTnLst>
+                                    <p:set>
+                                      <p:cBhvr>
+                                        <p:cTn id="6" dur="1" fill="hold">
+                                          <p:stCondLst>
+                                            <p:cond delay="0"/>
+                                          </p:stCondLst>
+                                        </p:cTn>
+                                        <p:tgtEl>
+                                          <p:spTgt spid="6">
+                                            <p:txEl>
+                                              <p:pRg st="0" end="0"/>
+                                            </p:txEl>
+                                          </p:spTgt>
+                                        </p:tgtEl>
+                                        <p:attrNameLst>
+                                          <p:attrName>style.visibility</p:attrName>
+                                        </p:attrNameLst>
+                                      </p:cBhvr>
+                                      <p:to>
+                                        <p:strVal val="visible"/>
+                                      </p:to>
+                                    </p:set>
+                                  </p:childTnLst>
+                                </p:cTn>
+                              </p:par>
+                            </p:childTnLst>
+                          </p:cTn>
+                        </p:par>
+                      </p:childTnLst>
+                    </p:cTn>
+                  </p:par>
+                </p:childTnLst>
+              </p:cTn>
+              <p:prevCondLst>
+                <p:cond evt="onPrev" delay="0">
+                  <p:tgtEl>
+                    <p:sldTgt/>
+                  </p:tgtEl>
+                </p:cond>
+              </p:prevCondLst>
+              <p:nextCondLst>
+                <p:cond evt="onNext" delay="0">
+                  <p:tgtEl>
+                    <p:sldTgt/>
+                  </p:tgtEl>
+                </p:cond>
+              </p:nextCondLst>
+            </p:seq>
+          </p:childTnLst>
+        </p:cTn>
+      </p:par>
+    </p:tnLst>
+    <p:bldLst>
+      <p:bldP spid="6" grpId="0" uiExpand="1" build="p"/>
+    </p:bldLst>
+  </p:timing>
 </p:sld>
 </file>
 
@@ -4960,10 +5133,168 @@
       </p:grpSpPr>
       <p:sp>
         <p:nvSpPr>
-          <p:cNvPr id="2" name="כותרת 1">
-            <a:extLst>
-              <a:ext uri="{FF2B5EF4-FFF2-40B4-BE49-F238E27FC236}">
-                <a16:creationId xmlns:a16="http://schemas.microsoft.com/office/drawing/2014/main" id="{F9C99FD8-CEE6-9CE7-C344-5E308996751E}"/>
+          <p:cNvPr id="4" name="Title 1">
+            <a:extLst>
+              <a:ext uri="{FF2B5EF4-FFF2-40B4-BE49-F238E27FC236}">
+                <a16:creationId xmlns:a16="http://schemas.microsoft.com/office/drawing/2014/main" id="{DAEF54B3-356A-2160-ED34-00BC86F9E858}"/>
+              </a:ext>
+            </a:extLst>
+          </p:cNvPr>
+          <p:cNvSpPr txBox="1">
+            <a:spLocks/>
+          </p:cNvSpPr>
+          <p:nvPr/>
+        </p:nvSpPr>
+        <p:spPr>
+          <a:xfrm>
+            <a:off x="990600" y="517525"/>
+            <a:ext cx="10515600" cy="1325563"/>
+          </a:xfrm>
+          <a:prstGeom prst="rect">
+            <a:avLst/>
+          </a:prstGeom>
+        </p:spPr>
+        <p:txBody>
+          <a:bodyPr vert="horz" lIns="91440" tIns="45720" rIns="91440" bIns="45720" rtlCol="1" anchor="ctr">
+            <a:normAutofit/>
+          </a:bodyPr>
+          <a:lstStyle>
+            <a:lvl1pPr algn="r" defTabSz="914400" rtl="1" eaLnBrk="1" latinLnBrk="0" hangingPunct="1">
+              <a:lnSpc>
+                <a:spcPct val="90000"/>
+              </a:lnSpc>
+              <a:spcBef>
+                <a:spcPct val="0"/>
+              </a:spcBef>
+              <a:buNone/>
+              <a:defRPr sz="4400" kern="1200">
+                <a:solidFill>
+                  <a:schemeClr val="tx1"/>
+                </a:solidFill>
+                <a:latin typeface="+mj-lt"/>
+                <a:ea typeface="+mj-ea"/>
+                <a:cs typeface="+mj-cs"/>
+              </a:defRPr>
+            </a:lvl1pPr>
+          </a:lstStyle>
+          <a:p>
+            <a:pPr algn="ctr" rtl="0"/>
+            <a:r>
+              <a:rPr lang="en-US" dirty="0">
+                <a:solidFill>
+                  <a:srgbClr val="0070C0"/>
+                </a:solidFill>
+                <a:effectLst>
+                  <a:outerShdw blurRad="38100" dist="38100" dir="2700000" algn="tl">
+                    <a:srgbClr val="000000">
+                      <a:alpha val="43137"/>
+                    </a:srgbClr>
+                  </a:outerShdw>
+                </a:effectLst>
+                <a:latin typeface="Comic Sans MS" panose="030F0702030302020204" pitchFamily="66" charset="0"/>
+                <a:ea typeface="+mn-ea"/>
+                <a:cs typeface="+mn-cs"/>
+              </a:rPr>
+              <a:t>Fixed average fitness depends on mutation rate</a:t>
+            </a:r>
+            <a:endParaRPr lang="en-US" dirty="0"/>
+          </a:p>
+        </p:txBody>
+      </p:sp>
+      <p:pic>
+        <p:nvPicPr>
+          <p:cNvPr id="5" name="תמונה 4">
+            <a:extLst>
+              <a:ext uri="{FF2B5EF4-FFF2-40B4-BE49-F238E27FC236}">
+                <a16:creationId xmlns:a16="http://schemas.microsoft.com/office/drawing/2014/main" id="{86A2F5D0-E37D-4620-6D9E-E20C476E53AD}"/>
+              </a:ext>
+            </a:extLst>
+          </p:cNvPr>
+          <p:cNvPicPr>
+            <a:picLocks noChangeAspect="1"/>
+          </p:cNvPicPr>
+          <p:nvPr/>
+        </p:nvPicPr>
+        <p:blipFill rotWithShape="1">
+          <a:blip r:embed="rId2">
+            <a:extLst>
+              <a:ext uri="{28A0092B-C50C-407E-A947-70E740481C1C}">
+                <a14:useLocalDpi xmlns:a14="http://schemas.microsoft.com/office/drawing/2010/main" val="0"/>
+              </a:ext>
+            </a:extLst>
+          </a:blip>
+          <a:srcRect t="7985"/>
+          <a:stretch/>
+        </p:blipFill>
+        <p:spPr bwMode="auto">
+          <a:xfrm>
+            <a:off x="6219190" y="2691931"/>
+            <a:ext cx="5287010" cy="3648544"/>
+          </a:xfrm>
+          <a:prstGeom prst="rect">
+            <a:avLst/>
+          </a:prstGeom>
+          <a:noFill/>
+          <a:ln>
+            <a:noFill/>
+          </a:ln>
+          <a:extLst>
+            <a:ext uri="{53640926-AAD7-44D8-BBD7-CCE9431645EC}">
+              <a14:shadowObscured xmlns:a14="http://schemas.microsoft.com/office/drawing/2010/main"/>
+            </a:ext>
+          </a:extLst>
+        </p:spPr>
+      </p:pic>
+      <p:pic>
+        <p:nvPicPr>
+          <p:cNvPr id="6" name="תמונה 5">
+            <a:extLst>
+              <a:ext uri="{FF2B5EF4-FFF2-40B4-BE49-F238E27FC236}">
+                <a16:creationId xmlns:a16="http://schemas.microsoft.com/office/drawing/2014/main" id="{D359B1B9-9183-4E76-C049-B2241CDDA73B}"/>
+              </a:ext>
+            </a:extLst>
+          </p:cNvPr>
+          <p:cNvPicPr>
+            <a:picLocks noChangeAspect="1"/>
+          </p:cNvPicPr>
+          <p:nvPr/>
+        </p:nvPicPr>
+        <p:blipFill rotWithShape="1">
+          <a:blip r:embed="rId3">
+            <a:extLst>
+              <a:ext uri="{28A0092B-C50C-407E-A947-70E740481C1C}">
+                <a14:useLocalDpi xmlns:a14="http://schemas.microsoft.com/office/drawing/2010/main" val="0"/>
+              </a:ext>
+            </a:extLst>
+          </a:blip>
+          <a:srcRect t="11751"/>
+          <a:stretch/>
+        </p:blipFill>
+        <p:spPr bwMode="auto">
+          <a:xfrm>
+            <a:off x="0" y="2695768"/>
+            <a:ext cx="5513541" cy="3648543"/>
+          </a:xfrm>
+          <a:prstGeom prst="rect">
+            <a:avLst/>
+          </a:prstGeom>
+          <a:noFill/>
+          <a:ln>
+            <a:noFill/>
+          </a:ln>
+          <a:extLst>
+            <a:ext uri="{53640926-AAD7-44D8-BBD7-CCE9431645EC}">
+              <a14:shadowObscured xmlns:a14="http://schemas.microsoft.com/office/drawing/2010/main"/>
+            </a:ext>
+          </a:extLst>
+        </p:spPr>
+      </p:pic>
+      <p:sp>
+        <p:nvSpPr>
+          <p:cNvPr id="7" name="Content Placeholder 2">
+            <a:extLst>
+              <a:ext uri="{FF2B5EF4-FFF2-40B4-BE49-F238E27FC236}">
+                <a16:creationId xmlns:a16="http://schemas.microsoft.com/office/drawing/2014/main" id="{40AEB386-DF29-D98F-999A-A0E0D05B3E66}"/>
               </a:ext>
             </a:extLst>
           </p:cNvPr>
@@ -4971,40 +5302,231 @@
             <a:spLocks noGrp="1"/>
           </p:cNvSpPr>
           <p:nvPr>
-            <p:ph type="title"/>
-          </p:nvPr>
-        </p:nvSpPr>
-        <p:spPr/>
-        <p:txBody>
-          <a:bodyPr/>
+            <p:ph idx="1"/>
+          </p:nvPr>
+        </p:nvSpPr>
+        <p:spPr>
+          <a:xfrm>
+            <a:off x="1219200" y="2202426"/>
+            <a:ext cx="2890683" cy="489505"/>
+          </a:xfrm>
+        </p:spPr>
+        <p:txBody>
+          <a:bodyPr>
+            <a:normAutofit/>
+          </a:bodyPr>
           <a:lstStyle/>
           <a:p>
-            <a:endParaRPr lang="he-IL"/>
-          </a:p>
-        </p:txBody>
-      </p:sp>
-      <p:sp>
-        <p:nvSpPr>
-          <p:cNvPr id="3" name="מציין מיקום תוכן 2">
-            <a:extLst>
-              <a:ext uri="{FF2B5EF4-FFF2-40B4-BE49-F238E27FC236}">
-                <a16:creationId xmlns:a16="http://schemas.microsoft.com/office/drawing/2014/main" id="{342979BB-86DB-35D2-E725-F4259F68D7AB}"/>
-              </a:ext>
-            </a:extLst>
-          </p:cNvPr>
-          <p:cNvSpPr>
-            <a:spLocks noGrp="1"/>
-          </p:cNvSpPr>
-          <p:nvPr>
-            <p:ph idx="1"/>
-          </p:nvPr>
-        </p:nvSpPr>
-        <p:spPr/>
-        <p:txBody>
-          <a:bodyPr/>
-          <a:lstStyle/>
-          <a:p>
-            <a:endParaRPr lang="he-IL"/>
+            <a:pPr marL="0" indent="0" algn="l" rtl="0">
+              <a:buNone/>
+            </a:pPr>
+            <a:r>
+              <a:rPr lang="en-US" b="1" i="1" dirty="0"/>
+              <a:t>Fitness (q=0)</a:t>
+            </a:r>
+          </a:p>
+        </p:txBody>
+      </p:sp>
+      <p:sp>
+        <p:nvSpPr>
+          <p:cNvPr id="8" name="Content Placeholder 2">
+            <a:extLst>
+              <a:ext uri="{FF2B5EF4-FFF2-40B4-BE49-F238E27FC236}">
+                <a16:creationId xmlns:a16="http://schemas.microsoft.com/office/drawing/2014/main" id="{483528BE-82DD-FC85-2279-0CF0DD9F5FAD}"/>
+              </a:ext>
+            </a:extLst>
+          </p:cNvPr>
+          <p:cNvSpPr txBox="1">
+            <a:spLocks/>
+          </p:cNvSpPr>
+          <p:nvPr/>
+        </p:nvSpPr>
+        <p:spPr>
+          <a:xfrm>
+            <a:off x="5830529" y="2202425"/>
+            <a:ext cx="4886632" cy="489505"/>
+          </a:xfrm>
+          <a:prstGeom prst="rect">
+            <a:avLst/>
+          </a:prstGeom>
+        </p:spPr>
+        <p:txBody>
+          <a:bodyPr vert="horz" lIns="91440" tIns="45720" rIns="91440" bIns="45720" rtlCol="1">
+            <a:noAutofit/>
+          </a:bodyPr>
+          <a:lstStyle>
+            <a:lvl1pPr marL="228600" indent="-228600" algn="r" defTabSz="914400" rtl="1" eaLnBrk="1" latinLnBrk="0" hangingPunct="1">
+              <a:lnSpc>
+                <a:spcPct val="90000"/>
+              </a:lnSpc>
+              <a:spcBef>
+                <a:spcPts val="1000"/>
+              </a:spcBef>
+              <a:buFont typeface="Arial" panose="020B0604020202020204" pitchFamily="34" charset="0"/>
+              <a:buChar char="•"/>
+              <a:defRPr sz="2800" kern="1200">
+                <a:solidFill>
+                  <a:schemeClr val="tx1"/>
+                </a:solidFill>
+                <a:latin typeface="+mn-lt"/>
+                <a:ea typeface="+mn-ea"/>
+                <a:cs typeface="+mn-cs"/>
+              </a:defRPr>
+            </a:lvl1pPr>
+            <a:lvl2pPr marL="685800" indent="-228600" algn="r" defTabSz="914400" rtl="1" eaLnBrk="1" latinLnBrk="0" hangingPunct="1">
+              <a:lnSpc>
+                <a:spcPct val="90000"/>
+              </a:lnSpc>
+              <a:spcBef>
+                <a:spcPts val="500"/>
+              </a:spcBef>
+              <a:buFont typeface="Arial" panose="020B0604020202020204" pitchFamily="34" charset="0"/>
+              <a:buChar char="•"/>
+              <a:defRPr sz="2400" kern="1200">
+                <a:solidFill>
+                  <a:schemeClr val="tx1"/>
+                </a:solidFill>
+                <a:latin typeface="+mn-lt"/>
+                <a:ea typeface="+mn-ea"/>
+                <a:cs typeface="+mn-cs"/>
+              </a:defRPr>
+            </a:lvl2pPr>
+            <a:lvl3pPr marL="1143000" indent="-228600" algn="r" defTabSz="914400" rtl="1" eaLnBrk="1" latinLnBrk="0" hangingPunct="1">
+              <a:lnSpc>
+                <a:spcPct val="90000"/>
+              </a:lnSpc>
+              <a:spcBef>
+                <a:spcPts val="500"/>
+              </a:spcBef>
+              <a:buFont typeface="Arial" panose="020B0604020202020204" pitchFamily="34" charset="0"/>
+              <a:buChar char="•"/>
+              <a:defRPr sz="2000" kern="1200">
+                <a:solidFill>
+                  <a:schemeClr val="tx1"/>
+                </a:solidFill>
+                <a:latin typeface="+mn-lt"/>
+                <a:ea typeface="+mn-ea"/>
+                <a:cs typeface="+mn-cs"/>
+              </a:defRPr>
+            </a:lvl3pPr>
+            <a:lvl4pPr marL="1600200" indent="-228600" algn="r" defTabSz="914400" rtl="1" eaLnBrk="1" latinLnBrk="0" hangingPunct="1">
+              <a:lnSpc>
+                <a:spcPct val="90000"/>
+              </a:lnSpc>
+              <a:spcBef>
+                <a:spcPts val="500"/>
+              </a:spcBef>
+              <a:buFont typeface="Arial" panose="020B0604020202020204" pitchFamily="34" charset="0"/>
+              <a:buChar char="•"/>
+              <a:defRPr sz="1800" kern="1200">
+                <a:solidFill>
+                  <a:schemeClr val="tx1"/>
+                </a:solidFill>
+                <a:latin typeface="+mn-lt"/>
+                <a:ea typeface="+mn-ea"/>
+                <a:cs typeface="+mn-cs"/>
+              </a:defRPr>
+            </a:lvl4pPr>
+            <a:lvl5pPr marL="2057400" indent="-228600" algn="r" defTabSz="914400" rtl="1" eaLnBrk="1" latinLnBrk="0" hangingPunct="1">
+              <a:lnSpc>
+                <a:spcPct val="90000"/>
+              </a:lnSpc>
+              <a:spcBef>
+                <a:spcPts val="500"/>
+              </a:spcBef>
+              <a:buFont typeface="Arial" panose="020B0604020202020204" pitchFamily="34" charset="0"/>
+              <a:buChar char="•"/>
+              <a:defRPr sz="1800" kern="1200">
+                <a:solidFill>
+                  <a:schemeClr val="tx1"/>
+                </a:solidFill>
+                <a:latin typeface="+mn-lt"/>
+                <a:ea typeface="+mn-ea"/>
+                <a:cs typeface="+mn-cs"/>
+              </a:defRPr>
+            </a:lvl5pPr>
+            <a:lvl6pPr marL="2514600" indent="-228600" algn="r" defTabSz="914400" rtl="1" eaLnBrk="1" latinLnBrk="0" hangingPunct="1">
+              <a:lnSpc>
+                <a:spcPct val="90000"/>
+              </a:lnSpc>
+              <a:spcBef>
+                <a:spcPts val="500"/>
+              </a:spcBef>
+              <a:buFont typeface="Arial" panose="020B0604020202020204" pitchFamily="34" charset="0"/>
+              <a:buChar char="•"/>
+              <a:defRPr sz="1800" kern="1200">
+                <a:solidFill>
+                  <a:schemeClr val="tx1"/>
+                </a:solidFill>
+                <a:latin typeface="+mn-lt"/>
+                <a:ea typeface="+mn-ea"/>
+                <a:cs typeface="+mn-cs"/>
+              </a:defRPr>
+            </a:lvl6pPr>
+            <a:lvl7pPr marL="2971800" indent="-228600" algn="r" defTabSz="914400" rtl="1" eaLnBrk="1" latinLnBrk="0" hangingPunct="1">
+              <a:lnSpc>
+                <a:spcPct val="90000"/>
+              </a:lnSpc>
+              <a:spcBef>
+                <a:spcPts val="500"/>
+              </a:spcBef>
+              <a:buFont typeface="Arial" panose="020B0604020202020204" pitchFamily="34" charset="0"/>
+              <a:buChar char="•"/>
+              <a:defRPr sz="1800" kern="1200">
+                <a:solidFill>
+                  <a:schemeClr val="tx1"/>
+                </a:solidFill>
+                <a:latin typeface="+mn-lt"/>
+                <a:ea typeface="+mn-ea"/>
+                <a:cs typeface="+mn-cs"/>
+              </a:defRPr>
+            </a:lvl7pPr>
+            <a:lvl8pPr marL="3429000" indent="-228600" algn="r" defTabSz="914400" rtl="1" eaLnBrk="1" latinLnBrk="0" hangingPunct="1">
+              <a:lnSpc>
+                <a:spcPct val="90000"/>
+              </a:lnSpc>
+              <a:spcBef>
+                <a:spcPts val="500"/>
+              </a:spcBef>
+              <a:buFont typeface="Arial" panose="020B0604020202020204" pitchFamily="34" charset="0"/>
+              <a:buChar char="•"/>
+              <a:defRPr sz="1800" kern="1200">
+                <a:solidFill>
+                  <a:schemeClr val="tx1"/>
+                </a:solidFill>
+                <a:latin typeface="+mn-lt"/>
+                <a:ea typeface="+mn-ea"/>
+                <a:cs typeface="+mn-cs"/>
+              </a:defRPr>
+            </a:lvl8pPr>
+            <a:lvl9pPr marL="3886200" indent="-228600" algn="r" defTabSz="914400" rtl="1" eaLnBrk="1" latinLnBrk="0" hangingPunct="1">
+              <a:lnSpc>
+                <a:spcPct val="90000"/>
+              </a:lnSpc>
+              <a:spcBef>
+                <a:spcPts val="500"/>
+              </a:spcBef>
+              <a:buFont typeface="Arial" panose="020B0604020202020204" pitchFamily="34" charset="0"/>
+              <a:buChar char="•"/>
+              <a:defRPr sz="1800" kern="1200">
+                <a:solidFill>
+                  <a:schemeClr val="tx1"/>
+                </a:solidFill>
+                <a:latin typeface="+mn-lt"/>
+                <a:ea typeface="+mn-ea"/>
+                <a:cs typeface="+mn-cs"/>
+              </a:defRPr>
+            </a:lvl9pPr>
+          </a:lstStyle>
+          <a:p>
+            <a:pPr marL="0" indent="0" algn="l" rtl="0">
+              <a:buFont typeface="Arial" panose="020B0604020202020204" pitchFamily="34" charset="0"/>
+              <a:buNone/>
+            </a:pPr>
+            <a:r>
+              <a:rPr lang="en-US" b="1" i="1" dirty="0"/>
+              <a:t>Frequency of species (q=0)</a:t>
+            </a:r>
           </a:p>
         </p:txBody>
       </p:sp>
@@ -5012,6 +5534,2190 @@
     <p:extLst>
       <p:ext uri="{BB962C8B-B14F-4D97-AF65-F5344CB8AC3E}">
         <p14:creationId xmlns:p14="http://schemas.microsoft.com/office/powerpoint/2010/main" val="4085808120"/>
+      </p:ext>
+    </p:extLst>
+  </p:cSld>
+  <p:clrMapOvr>
+    <a:masterClrMapping/>
+  </p:clrMapOvr>
+  <p:timing>
+    <p:tnLst>
+      <p:par>
+        <p:cTn id="1" dur="indefinite" restart="never" nodeType="tmRoot">
+          <p:childTnLst>
+            <p:seq concurrent="1" nextAc="seek">
+              <p:cTn id="2" dur="indefinite" nodeType="mainSeq">
+                <p:childTnLst>
+                  <p:par>
+                    <p:cTn id="3" fill="hold">
+                      <p:stCondLst>
+                        <p:cond delay="indefinite"/>
+                      </p:stCondLst>
+                      <p:childTnLst>
+                        <p:par>
+                          <p:cTn id="4" fill="hold">
+                            <p:stCondLst>
+                              <p:cond delay="0"/>
+                            </p:stCondLst>
+                            <p:childTnLst>
+                              <p:par>
+                                <p:cTn id="5" presetID="1" presetClass="entr" presetSubtype="0" fill="hold" grpId="0" nodeType="clickEffect">
+                                  <p:stCondLst>
+                                    <p:cond delay="0"/>
+                                  </p:stCondLst>
+                                  <p:childTnLst>
+                                    <p:set>
+                                      <p:cBhvr>
+                                        <p:cTn id="6" dur="1" fill="hold">
+                                          <p:stCondLst>
+                                            <p:cond delay="0"/>
+                                          </p:stCondLst>
+                                        </p:cTn>
+                                        <p:tgtEl>
+                                          <p:spTgt spid="7">
+                                            <p:txEl>
+                                              <p:pRg st="0" end="0"/>
+                                            </p:txEl>
+                                          </p:spTgt>
+                                        </p:tgtEl>
+                                        <p:attrNameLst>
+                                          <p:attrName>style.visibility</p:attrName>
+                                        </p:attrNameLst>
+                                      </p:cBhvr>
+                                      <p:to>
+                                        <p:strVal val="visible"/>
+                                      </p:to>
+                                    </p:set>
+                                  </p:childTnLst>
+                                </p:cTn>
+                              </p:par>
+                            </p:childTnLst>
+                          </p:cTn>
+                        </p:par>
+                      </p:childTnLst>
+                    </p:cTn>
+                  </p:par>
+                  <p:par>
+                    <p:cTn id="7" fill="hold">
+                      <p:stCondLst>
+                        <p:cond delay="indefinite"/>
+                      </p:stCondLst>
+                      <p:childTnLst>
+                        <p:par>
+                          <p:cTn id="8" fill="hold">
+                            <p:stCondLst>
+                              <p:cond delay="0"/>
+                            </p:stCondLst>
+                            <p:childTnLst>
+                              <p:par>
+                                <p:cTn id="9" presetID="1" presetClass="entr" presetSubtype="0" fill="hold" grpId="0" nodeType="clickEffect">
+                                  <p:stCondLst>
+                                    <p:cond delay="0"/>
+                                  </p:stCondLst>
+                                  <p:childTnLst>
+                                    <p:set>
+                                      <p:cBhvr>
+                                        <p:cTn id="10" dur="1" fill="hold">
+                                          <p:stCondLst>
+                                            <p:cond delay="0"/>
+                                          </p:stCondLst>
+                                        </p:cTn>
+                                        <p:tgtEl>
+                                          <p:spTgt spid="8">
+                                            <p:txEl>
+                                              <p:pRg st="0" end="0"/>
+                                            </p:txEl>
+                                          </p:spTgt>
+                                        </p:tgtEl>
+                                        <p:attrNameLst>
+                                          <p:attrName>style.visibility</p:attrName>
+                                        </p:attrNameLst>
+                                      </p:cBhvr>
+                                      <p:to>
+                                        <p:strVal val="visible"/>
+                                      </p:to>
+                                    </p:set>
+                                  </p:childTnLst>
+                                </p:cTn>
+                              </p:par>
+                            </p:childTnLst>
+                          </p:cTn>
+                        </p:par>
+                      </p:childTnLst>
+                    </p:cTn>
+                  </p:par>
+                </p:childTnLst>
+              </p:cTn>
+              <p:prevCondLst>
+                <p:cond evt="onPrev" delay="0">
+                  <p:tgtEl>
+                    <p:sldTgt/>
+                  </p:tgtEl>
+                </p:cond>
+              </p:prevCondLst>
+              <p:nextCondLst>
+                <p:cond evt="onNext" delay="0">
+                  <p:tgtEl>
+                    <p:sldTgt/>
+                  </p:tgtEl>
+                </p:cond>
+              </p:nextCondLst>
+            </p:seq>
+          </p:childTnLst>
+        </p:cTn>
+      </p:par>
+    </p:tnLst>
+    <p:bldLst>
+      <p:bldP spid="7" grpId="0" uiExpand="1" build="p"/>
+      <p:bldP spid="8" grpId="0" uiExpand="1" build="p"/>
+    </p:bldLst>
+  </p:timing>
+</p:sld>
+</file>
+
+<file path=ppt/slides/slide5.xml><?xml version="1.0" encoding="utf-8"?>
+<p:sld xmlns:a="http://schemas.openxmlformats.org/drawingml/2006/main" xmlns:r="http://schemas.openxmlformats.org/officeDocument/2006/relationships" xmlns:p="http://schemas.openxmlformats.org/presentationml/2006/main">
+  <p:cSld>
+    <p:spTree>
+      <p:nvGrpSpPr>
+        <p:cNvPr id="1" name="">
+          <a:extLst>
+            <a:ext uri="{FF2B5EF4-FFF2-40B4-BE49-F238E27FC236}">
+              <a16:creationId xmlns:a16="http://schemas.microsoft.com/office/drawing/2014/main" id="{A16928A0-A6EA-99C0-A490-FF42EEE24E47}"/>
+            </a:ext>
+          </a:extLst>
+        </p:cNvPr>
+        <p:cNvGrpSpPr/>
+        <p:nvPr/>
+      </p:nvGrpSpPr>
+      <p:grpSpPr>
+        <a:xfrm>
+          <a:off x="0" y="0"/>
+          <a:ext cx="0" cy="0"/>
+          <a:chOff x="0" y="0"/>
+          <a:chExt cx="0" cy="0"/>
+        </a:xfrm>
+      </p:grpSpPr>
+      <p:sp>
+        <p:nvSpPr>
+          <p:cNvPr id="4" name="Title 1">
+            <a:extLst>
+              <a:ext uri="{FF2B5EF4-FFF2-40B4-BE49-F238E27FC236}">
+                <a16:creationId xmlns:a16="http://schemas.microsoft.com/office/drawing/2014/main" id="{0513B7CB-26D4-F2D1-C18F-0D20ADBD33F0}"/>
+              </a:ext>
+            </a:extLst>
+          </p:cNvPr>
+          <p:cNvSpPr txBox="1">
+            <a:spLocks/>
+          </p:cNvSpPr>
+          <p:nvPr/>
+        </p:nvSpPr>
+        <p:spPr>
+          <a:xfrm>
+            <a:off x="990600" y="517525"/>
+            <a:ext cx="10515600" cy="1325563"/>
+          </a:xfrm>
+          <a:prstGeom prst="rect">
+            <a:avLst/>
+          </a:prstGeom>
+        </p:spPr>
+        <p:txBody>
+          <a:bodyPr vert="horz" lIns="91440" tIns="45720" rIns="91440" bIns="45720" rtlCol="1" anchor="ctr">
+            <a:normAutofit/>
+          </a:bodyPr>
+          <a:lstStyle>
+            <a:lvl1pPr algn="r" defTabSz="914400" rtl="1" eaLnBrk="1" latinLnBrk="0" hangingPunct="1">
+              <a:lnSpc>
+                <a:spcPct val="90000"/>
+              </a:lnSpc>
+              <a:spcBef>
+                <a:spcPct val="0"/>
+              </a:spcBef>
+              <a:buNone/>
+              <a:defRPr sz="4400" kern="1200">
+                <a:solidFill>
+                  <a:schemeClr val="tx1"/>
+                </a:solidFill>
+                <a:latin typeface="+mj-lt"/>
+                <a:ea typeface="+mj-ea"/>
+                <a:cs typeface="+mj-cs"/>
+              </a:defRPr>
+            </a:lvl1pPr>
+          </a:lstStyle>
+          <a:p>
+            <a:pPr algn="ctr" rtl="0"/>
+            <a:r>
+              <a:rPr lang="en-US" dirty="0">
+                <a:solidFill>
+                  <a:srgbClr val="0070C0"/>
+                </a:solidFill>
+                <a:effectLst>
+                  <a:outerShdw blurRad="38100" dist="38100" dir="2700000" algn="tl">
+                    <a:srgbClr val="000000">
+                      <a:alpha val="43137"/>
+                    </a:srgbClr>
+                  </a:outerShdw>
+                </a:effectLst>
+                <a:latin typeface="Comic Sans MS" panose="030F0702030302020204" pitchFamily="66" charset="0"/>
+                <a:ea typeface="+mn-ea"/>
+                <a:cs typeface="+mn-cs"/>
+              </a:rPr>
+              <a:t>Fixed average fitness depends on mutation rate</a:t>
+            </a:r>
+            <a:endParaRPr lang="en-US" dirty="0"/>
+          </a:p>
+        </p:txBody>
+      </p:sp>
+      <p:sp>
+        <p:nvSpPr>
+          <p:cNvPr id="7" name="Content Placeholder 2">
+            <a:extLst>
+              <a:ext uri="{FF2B5EF4-FFF2-40B4-BE49-F238E27FC236}">
+                <a16:creationId xmlns:a16="http://schemas.microsoft.com/office/drawing/2014/main" id="{8C7E8AD6-527C-4B02-9A46-7EE97AE10AAF}"/>
+              </a:ext>
+            </a:extLst>
+          </p:cNvPr>
+          <p:cNvSpPr>
+            <a:spLocks noGrp="1"/>
+          </p:cNvSpPr>
+          <p:nvPr>
+            <p:ph idx="1"/>
+          </p:nvPr>
+        </p:nvSpPr>
+        <p:spPr>
+          <a:xfrm>
+            <a:off x="1219200" y="2202426"/>
+            <a:ext cx="3647768" cy="489505"/>
+          </a:xfrm>
+        </p:spPr>
+        <p:txBody>
+          <a:bodyPr>
+            <a:noAutofit/>
+          </a:bodyPr>
+          <a:lstStyle/>
+          <a:p>
+            <a:pPr marL="0" indent="0" algn="l" rtl="0">
+              <a:buNone/>
+            </a:pPr>
+            <a:r>
+              <a:rPr lang="en-US" b="1" i="1" dirty="0"/>
+              <a:t>Fitness (q=0.001)</a:t>
+            </a:r>
+          </a:p>
+        </p:txBody>
+      </p:sp>
+      <p:sp>
+        <p:nvSpPr>
+          <p:cNvPr id="8" name="Content Placeholder 2">
+            <a:extLst>
+              <a:ext uri="{FF2B5EF4-FFF2-40B4-BE49-F238E27FC236}">
+                <a16:creationId xmlns:a16="http://schemas.microsoft.com/office/drawing/2014/main" id="{8503967D-E49B-AAD0-38A5-4DEFDAA18B00}"/>
+              </a:ext>
+            </a:extLst>
+          </p:cNvPr>
+          <p:cNvSpPr txBox="1">
+            <a:spLocks/>
+          </p:cNvSpPr>
+          <p:nvPr/>
+        </p:nvSpPr>
+        <p:spPr>
+          <a:xfrm>
+            <a:off x="6420465" y="2202425"/>
+            <a:ext cx="5260258" cy="489505"/>
+          </a:xfrm>
+          <a:prstGeom prst="rect">
+            <a:avLst/>
+          </a:prstGeom>
+        </p:spPr>
+        <p:txBody>
+          <a:bodyPr vert="horz" lIns="91440" tIns="45720" rIns="91440" bIns="45720" rtlCol="1">
+            <a:noAutofit/>
+          </a:bodyPr>
+          <a:lstStyle>
+            <a:lvl1pPr marL="228600" indent="-228600" algn="r" defTabSz="914400" rtl="1" eaLnBrk="1" latinLnBrk="0" hangingPunct="1">
+              <a:lnSpc>
+                <a:spcPct val="90000"/>
+              </a:lnSpc>
+              <a:spcBef>
+                <a:spcPts val="1000"/>
+              </a:spcBef>
+              <a:buFont typeface="Arial" panose="020B0604020202020204" pitchFamily="34" charset="0"/>
+              <a:buChar char="•"/>
+              <a:defRPr sz="2800" kern="1200">
+                <a:solidFill>
+                  <a:schemeClr val="tx1"/>
+                </a:solidFill>
+                <a:latin typeface="+mn-lt"/>
+                <a:ea typeface="+mn-ea"/>
+                <a:cs typeface="+mn-cs"/>
+              </a:defRPr>
+            </a:lvl1pPr>
+            <a:lvl2pPr marL="685800" indent="-228600" algn="r" defTabSz="914400" rtl="1" eaLnBrk="1" latinLnBrk="0" hangingPunct="1">
+              <a:lnSpc>
+                <a:spcPct val="90000"/>
+              </a:lnSpc>
+              <a:spcBef>
+                <a:spcPts val="500"/>
+              </a:spcBef>
+              <a:buFont typeface="Arial" panose="020B0604020202020204" pitchFamily="34" charset="0"/>
+              <a:buChar char="•"/>
+              <a:defRPr sz="2400" kern="1200">
+                <a:solidFill>
+                  <a:schemeClr val="tx1"/>
+                </a:solidFill>
+                <a:latin typeface="+mn-lt"/>
+                <a:ea typeface="+mn-ea"/>
+                <a:cs typeface="+mn-cs"/>
+              </a:defRPr>
+            </a:lvl2pPr>
+            <a:lvl3pPr marL="1143000" indent="-228600" algn="r" defTabSz="914400" rtl="1" eaLnBrk="1" latinLnBrk="0" hangingPunct="1">
+              <a:lnSpc>
+                <a:spcPct val="90000"/>
+              </a:lnSpc>
+              <a:spcBef>
+                <a:spcPts val="500"/>
+              </a:spcBef>
+              <a:buFont typeface="Arial" panose="020B0604020202020204" pitchFamily="34" charset="0"/>
+              <a:buChar char="•"/>
+              <a:defRPr sz="2000" kern="1200">
+                <a:solidFill>
+                  <a:schemeClr val="tx1"/>
+                </a:solidFill>
+                <a:latin typeface="+mn-lt"/>
+                <a:ea typeface="+mn-ea"/>
+                <a:cs typeface="+mn-cs"/>
+              </a:defRPr>
+            </a:lvl3pPr>
+            <a:lvl4pPr marL="1600200" indent="-228600" algn="r" defTabSz="914400" rtl="1" eaLnBrk="1" latinLnBrk="0" hangingPunct="1">
+              <a:lnSpc>
+                <a:spcPct val="90000"/>
+              </a:lnSpc>
+              <a:spcBef>
+                <a:spcPts val="500"/>
+              </a:spcBef>
+              <a:buFont typeface="Arial" panose="020B0604020202020204" pitchFamily="34" charset="0"/>
+              <a:buChar char="•"/>
+              <a:defRPr sz="1800" kern="1200">
+                <a:solidFill>
+                  <a:schemeClr val="tx1"/>
+                </a:solidFill>
+                <a:latin typeface="+mn-lt"/>
+                <a:ea typeface="+mn-ea"/>
+                <a:cs typeface="+mn-cs"/>
+              </a:defRPr>
+            </a:lvl4pPr>
+            <a:lvl5pPr marL="2057400" indent="-228600" algn="r" defTabSz="914400" rtl="1" eaLnBrk="1" latinLnBrk="0" hangingPunct="1">
+              <a:lnSpc>
+                <a:spcPct val="90000"/>
+              </a:lnSpc>
+              <a:spcBef>
+                <a:spcPts val="500"/>
+              </a:spcBef>
+              <a:buFont typeface="Arial" panose="020B0604020202020204" pitchFamily="34" charset="0"/>
+              <a:buChar char="•"/>
+              <a:defRPr sz="1800" kern="1200">
+                <a:solidFill>
+                  <a:schemeClr val="tx1"/>
+                </a:solidFill>
+                <a:latin typeface="+mn-lt"/>
+                <a:ea typeface="+mn-ea"/>
+                <a:cs typeface="+mn-cs"/>
+              </a:defRPr>
+            </a:lvl5pPr>
+            <a:lvl6pPr marL="2514600" indent="-228600" algn="r" defTabSz="914400" rtl="1" eaLnBrk="1" latinLnBrk="0" hangingPunct="1">
+              <a:lnSpc>
+                <a:spcPct val="90000"/>
+              </a:lnSpc>
+              <a:spcBef>
+                <a:spcPts val="500"/>
+              </a:spcBef>
+              <a:buFont typeface="Arial" panose="020B0604020202020204" pitchFamily="34" charset="0"/>
+              <a:buChar char="•"/>
+              <a:defRPr sz="1800" kern="1200">
+                <a:solidFill>
+                  <a:schemeClr val="tx1"/>
+                </a:solidFill>
+                <a:latin typeface="+mn-lt"/>
+                <a:ea typeface="+mn-ea"/>
+                <a:cs typeface="+mn-cs"/>
+              </a:defRPr>
+            </a:lvl6pPr>
+            <a:lvl7pPr marL="2971800" indent="-228600" algn="r" defTabSz="914400" rtl="1" eaLnBrk="1" latinLnBrk="0" hangingPunct="1">
+              <a:lnSpc>
+                <a:spcPct val="90000"/>
+              </a:lnSpc>
+              <a:spcBef>
+                <a:spcPts val="500"/>
+              </a:spcBef>
+              <a:buFont typeface="Arial" panose="020B0604020202020204" pitchFamily="34" charset="0"/>
+              <a:buChar char="•"/>
+              <a:defRPr sz="1800" kern="1200">
+                <a:solidFill>
+                  <a:schemeClr val="tx1"/>
+                </a:solidFill>
+                <a:latin typeface="+mn-lt"/>
+                <a:ea typeface="+mn-ea"/>
+                <a:cs typeface="+mn-cs"/>
+              </a:defRPr>
+            </a:lvl7pPr>
+            <a:lvl8pPr marL="3429000" indent="-228600" algn="r" defTabSz="914400" rtl="1" eaLnBrk="1" latinLnBrk="0" hangingPunct="1">
+              <a:lnSpc>
+                <a:spcPct val="90000"/>
+              </a:lnSpc>
+              <a:spcBef>
+                <a:spcPts val="500"/>
+              </a:spcBef>
+              <a:buFont typeface="Arial" panose="020B0604020202020204" pitchFamily="34" charset="0"/>
+              <a:buChar char="•"/>
+              <a:defRPr sz="1800" kern="1200">
+                <a:solidFill>
+                  <a:schemeClr val="tx1"/>
+                </a:solidFill>
+                <a:latin typeface="+mn-lt"/>
+                <a:ea typeface="+mn-ea"/>
+                <a:cs typeface="+mn-cs"/>
+              </a:defRPr>
+            </a:lvl8pPr>
+            <a:lvl9pPr marL="3886200" indent="-228600" algn="r" defTabSz="914400" rtl="1" eaLnBrk="1" latinLnBrk="0" hangingPunct="1">
+              <a:lnSpc>
+                <a:spcPct val="90000"/>
+              </a:lnSpc>
+              <a:spcBef>
+                <a:spcPts val="500"/>
+              </a:spcBef>
+              <a:buFont typeface="Arial" panose="020B0604020202020204" pitchFamily="34" charset="0"/>
+              <a:buChar char="•"/>
+              <a:defRPr sz="1800" kern="1200">
+                <a:solidFill>
+                  <a:schemeClr val="tx1"/>
+                </a:solidFill>
+                <a:latin typeface="+mn-lt"/>
+                <a:ea typeface="+mn-ea"/>
+                <a:cs typeface="+mn-cs"/>
+              </a:defRPr>
+            </a:lvl9pPr>
+          </a:lstStyle>
+          <a:p>
+            <a:pPr marL="0" indent="0" algn="l" rtl="0">
+              <a:buFont typeface="Arial" panose="020B0604020202020204" pitchFamily="34" charset="0"/>
+              <a:buNone/>
+            </a:pPr>
+            <a:r>
+              <a:rPr lang="en-US" b="1" i="1" dirty="0"/>
+              <a:t>Frequency of species (q=0.001)</a:t>
+            </a:r>
+          </a:p>
+        </p:txBody>
+      </p:sp>
+      <p:pic>
+        <p:nvPicPr>
+          <p:cNvPr id="3" name="תמונה 2" descr="תמונה שמכילה טקסט, צילום מסך, קו, מלבן&#10;&#10;תוכן שנוצר על-ידי בינה מלאכותית עשוי להיות שגוי.">
+            <a:extLst>
+              <a:ext uri="{FF2B5EF4-FFF2-40B4-BE49-F238E27FC236}">
+                <a16:creationId xmlns:a16="http://schemas.microsoft.com/office/drawing/2014/main" id="{70C680BB-01F6-0270-AB55-F0CF2A72FB5C}"/>
+              </a:ext>
+            </a:extLst>
+          </p:cNvPr>
+          <p:cNvPicPr>
+            <a:picLocks noChangeAspect="1"/>
+          </p:cNvPicPr>
+          <p:nvPr/>
+        </p:nvPicPr>
+        <p:blipFill>
+          <a:blip r:embed="rId2">
+            <a:extLst>
+              <a:ext uri="{28A0092B-C50C-407E-A947-70E740481C1C}">
+                <a14:useLocalDpi xmlns:a14="http://schemas.microsoft.com/office/drawing/2010/main" val="0"/>
+              </a:ext>
+            </a:extLst>
+          </a:blip>
+          <a:srcRect t="11973"/>
+          <a:stretch/>
+        </p:blipFill>
+        <p:spPr>
+          <a:xfrm>
+            <a:off x="396228" y="2785825"/>
+            <a:ext cx="5852172" cy="3863590"/>
+          </a:xfrm>
+          <a:prstGeom prst="rect">
+            <a:avLst/>
+          </a:prstGeom>
+        </p:spPr>
+      </p:pic>
+      <p:pic>
+        <p:nvPicPr>
+          <p:cNvPr id="10" name="תמונה 9" descr="תמונה שמכילה טקסט, צילום מסך, תצוגה, תרשים&#10;&#10;תוכן שנוצר על-ידי בינה מלאכותית עשוי להיות שגוי.">
+            <a:extLst>
+              <a:ext uri="{FF2B5EF4-FFF2-40B4-BE49-F238E27FC236}">
+                <a16:creationId xmlns:a16="http://schemas.microsoft.com/office/drawing/2014/main" id="{F5DFDE7C-6C58-D275-5ECA-CE4C23B4D493}"/>
+              </a:ext>
+            </a:extLst>
+          </p:cNvPr>
+          <p:cNvPicPr>
+            <a:picLocks noChangeAspect="1"/>
+          </p:cNvPicPr>
+          <p:nvPr/>
+        </p:nvPicPr>
+        <p:blipFill>
+          <a:blip r:embed="rId3">
+            <a:extLst>
+              <a:ext uri="{28A0092B-C50C-407E-A947-70E740481C1C}">
+                <a14:useLocalDpi xmlns:a14="http://schemas.microsoft.com/office/drawing/2010/main" val="0"/>
+              </a:ext>
+            </a:extLst>
+          </a:blip>
+          <a:srcRect t="7046"/>
+          <a:stretch/>
+        </p:blipFill>
+        <p:spPr>
+          <a:xfrm>
+            <a:off x="6248400" y="2785825"/>
+            <a:ext cx="5852172" cy="4079899"/>
+          </a:xfrm>
+          <a:prstGeom prst="rect">
+            <a:avLst/>
+          </a:prstGeom>
+        </p:spPr>
+      </p:pic>
+    </p:spTree>
+    <p:extLst>
+      <p:ext uri="{BB962C8B-B14F-4D97-AF65-F5344CB8AC3E}">
+        <p14:creationId xmlns:p14="http://schemas.microsoft.com/office/powerpoint/2010/main" val="3350112598"/>
+      </p:ext>
+    </p:extLst>
+  </p:cSld>
+  <p:clrMapOvr>
+    <a:masterClrMapping/>
+  </p:clrMapOvr>
+  <p:timing>
+    <p:tnLst>
+      <p:par>
+        <p:cTn id="1" dur="indefinite" restart="never" nodeType="tmRoot">
+          <p:childTnLst>
+            <p:seq concurrent="1" nextAc="seek">
+              <p:cTn id="2" dur="indefinite" nodeType="mainSeq">
+                <p:childTnLst>
+                  <p:par>
+                    <p:cTn id="3" fill="hold">
+                      <p:stCondLst>
+                        <p:cond delay="indefinite"/>
+                      </p:stCondLst>
+                      <p:childTnLst>
+                        <p:par>
+                          <p:cTn id="4" fill="hold">
+                            <p:stCondLst>
+                              <p:cond delay="0"/>
+                            </p:stCondLst>
+                            <p:childTnLst>
+                              <p:par>
+                                <p:cTn id="5" presetID="1" presetClass="entr" presetSubtype="0" fill="hold" grpId="0" nodeType="clickEffect">
+                                  <p:stCondLst>
+                                    <p:cond delay="0"/>
+                                  </p:stCondLst>
+                                  <p:childTnLst>
+                                    <p:set>
+                                      <p:cBhvr>
+                                        <p:cTn id="6" dur="1" fill="hold">
+                                          <p:stCondLst>
+                                            <p:cond delay="0"/>
+                                          </p:stCondLst>
+                                        </p:cTn>
+                                        <p:tgtEl>
+                                          <p:spTgt spid="7">
+                                            <p:txEl>
+                                              <p:pRg st="0" end="0"/>
+                                            </p:txEl>
+                                          </p:spTgt>
+                                        </p:tgtEl>
+                                        <p:attrNameLst>
+                                          <p:attrName>style.visibility</p:attrName>
+                                        </p:attrNameLst>
+                                      </p:cBhvr>
+                                      <p:to>
+                                        <p:strVal val="visible"/>
+                                      </p:to>
+                                    </p:set>
+                                  </p:childTnLst>
+                                </p:cTn>
+                              </p:par>
+                            </p:childTnLst>
+                          </p:cTn>
+                        </p:par>
+                      </p:childTnLst>
+                    </p:cTn>
+                  </p:par>
+                  <p:par>
+                    <p:cTn id="7" fill="hold">
+                      <p:stCondLst>
+                        <p:cond delay="indefinite"/>
+                      </p:stCondLst>
+                      <p:childTnLst>
+                        <p:par>
+                          <p:cTn id="8" fill="hold">
+                            <p:stCondLst>
+                              <p:cond delay="0"/>
+                            </p:stCondLst>
+                            <p:childTnLst>
+                              <p:par>
+                                <p:cTn id="9" presetID="1" presetClass="entr" presetSubtype="0" fill="hold" grpId="0" nodeType="clickEffect">
+                                  <p:stCondLst>
+                                    <p:cond delay="0"/>
+                                  </p:stCondLst>
+                                  <p:childTnLst>
+                                    <p:set>
+                                      <p:cBhvr>
+                                        <p:cTn id="10" dur="1" fill="hold">
+                                          <p:stCondLst>
+                                            <p:cond delay="0"/>
+                                          </p:stCondLst>
+                                        </p:cTn>
+                                        <p:tgtEl>
+                                          <p:spTgt spid="8">
+                                            <p:txEl>
+                                              <p:pRg st="0" end="0"/>
+                                            </p:txEl>
+                                          </p:spTgt>
+                                        </p:tgtEl>
+                                        <p:attrNameLst>
+                                          <p:attrName>style.visibility</p:attrName>
+                                        </p:attrNameLst>
+                                      </p:cBhvr>
+                                      <p:to>
+                                        <p:strVal val="visible"/>
+                                      </p:to>
+                                    </p:set>
+                                  </p:childTnLst>
+                                </p:cTn>
+                              </p:par>
+                            </p:childTnLst>
+                          </p:cTn>
+                        </p:par>
+                      </p:childTnLst>
+                    </p:cTn>
+                  </p:par>
+                </p:childTnLst>
+              </p:cTn>
+              <p:prevCondLst>
+                <p:cond evt="onPrev" delay="0">
+                  <p:tgtEl>
+                    <p:sldTgt/>
+                  </p:tgtEl>
+                </p:cond>
+              </p:prevCondLst>
+              <p:nextCondLst>
+                <p:cond evt="onNext" delay="0">
+                  <p:tgtEl>
+                    <p:sldTgt/>
+                  </p:tgtEl>
+                </p:cond>
+              </p:nextCondLst>
+            </p:seq>
+          </p:childTnLst>
+        </p:cTn>
+      </p:par>
+    </p:tnLst>
+    <p:bldLst>
+      <p:bldP spid="7" grpId="0" uiExpand="1" build="p"/>
+      <p:bldP spid="8" grpId="0" uiExpand="1" build="p"/>
+    </p:bldLst>
+  </p:timing>
+</p:sld>
+</file>
+
+<file path=ppt/slides/slide6.xml><?xml version="1.0" encoding="utf-8"?>
+<p:sld xmlns:a="http://schemas.openxmlformats.org/drawingml/2006/main" xmlns:r="http://schemas.openxmlformats.org/officeDocument/2006/relationships" xmlns:p="http://schemas.openxmlformats.org/presentationml/2006/main">
+  <p:cSld>
+    <p:spTree>
+      <p:nvGrpSpPr>
+        <p:cNvPr id="1" name="">
+          <a:extLst>
+            <a:ext uri="{FF2B5EF4-FFF2-40B4-BE49-F238E27FC236}">
+              <a16:creationId xmlns:a16="http://schemas.microsoft.com/office/drawing/2014/main" id="{9DCC2CB3-6CCC-31E7-6099-E1B383084636}"/>
+            </a:ext>
+          </a:extLst>
+        </p:cNvPr>
+        <p:cNvGrpSpPr/>
+        <p:nvPr/>
+      </p:nvGrpSpPr>
+      <p:grpSpPr>
+        <a:xfrm>
+          <a:off x="0" y="0"/>
+          <a:ext cx="0" cy="0"/>
+          <a:chOff x="0" y="0"/>
+          <a:chExt cx="0" cy="0"/>
+        </a:xfrm>
+      </p:grpSpPr>
+      <p:sp>
+        <p:nvSpPr>
+          <p:cNvPr id="4" name="Title 1">
+            <a:extLst>
+              <a:ext uri="{FF2B5EF4-FFF2-40B4-BE49-F238E27FC236}">
+                <a16:creationId xmlns:a16="http://schemas.microsoft.com/office/drawing/2014/main" id="{A67AAC1A-AB21-F780-734D-E28CC134EB47}"/>
+              </a:ext>
+            </a:extLst>
+          </p:cNvPr>
+          <p:cNvSpPr txBox="1">
+            <a:spLocks/>
+          </p:cNvSpPr>
+          <p:nvPr/>
+        </p:nvSpPr>
+        <p:spPr>
+          <a:xfrm>
+            <a:off x="990600" y="517525"/>
+            <a:ext cx="10515600" cy="1325563"/>
+          </a:xfrm>
+          <a:prstGeom prst="rect">
+            <a:avLst/>
+          </a:prstGeom>
+        </p:spPr>
+        <p:txBody>
+          <a:bodyPr vert="horz" lIns="91440" tIns="45720" rIns="91440" bIns="45720" rtlCol="1" anchor="ctr">
+            <a:normAutofit/>
+          </a:bodyPr>
+          <a:lstStyle>
+            <a:lvl1pPr algn="r" defTabSz="914400" rtl="1" eaLnBrk="1" latinLnBrk="0" hangingPunct="1">
+              <a:lnSpc>
+                <a:spcPct val="90000"/>
+              </a:lnSpc>
+              <a:spcBef>
+                <a:spcPct val="0"/>
+              </a:spcBef>
+              <a:buNone/>
+              <a:defRPr sz="4400" kern="1200">
+                <a:solidFill>
+                  <a:schemeClr val="tx1"/>
+                </a:solidFill>
+                <a:latin typeface="+mj-lt"/>
+                <a:ea typeface="+mj-ea"/>
+                <a:cs typeface="+mj-cs"/>
+              </a:defRPr>
+            </a:lvl1pPr>
+          </a:lstStyle>
+          <a:p>
+            <a:pPr algn="ctr" rtl="0"/>
+            <a:r>
+              <a:rPr lang="en-US" dirty="0">
+                <a:solidFill>
+                  <a:srgbClr val="0070C0"/>
+                </a:solidFill>
+                <a:effectLst>
+                  <a:outerShdw blurRad="38100" dist="38100" dir="2700000" algn="tl">
+                    <a:srgbClr val="000000">
+                      <a:alpha val="43137"/>
+                    </a:srgbClr>
+                  </a:outerShdw>
+                </a:effectLst>
+                <a:latin typeface="Comic Sans MS" panose="030F0702030302020204" pitchFamily="66" charset="0"/>
+                <a:ea typeface="+mn-ea"/>
+                <a:cs typeface="+mn-cs"/>
+              </a:rPr>
+              <a:t>Fixed average fitness depends on mutation rate</a:t>
+            </a:r>
+            <a:endParaRPr lang="en-US" dirty="0"/>
+          </a:p>
+        </p:txBody>
+      </p:sp>
+      <p:sp>
+        <p:nvSpPr>
+          <p:cNvPr id="7" name="Content Placeholder 2">
+            <a:extLst>
+              <a:ext uri="{FF2B5EF4-FFF2-40B4-BE49-F238E27FC236}">
+                <a16:creationId xmlns:a16="http://schemas.microsoft.com/office/drawing/2014/main" id="{F0D3A73A-E113-5F82-617B-2A50F5FD2B0A}"/>
+              </a:ext>
+            </a:extLst>
+          </p:cNvPr>
+          <p:cNvSpPr>
+            <a:spLocks noGrp="1"/>
+          </p:cNvSpPr>
+          <p:nvPr>
+            <p:ph idx="1"/>
+          </p:nvPr>
+        </p:nvSpPr>
+        <p:spPr>
+          <a:xfrm>
+            <a:off x="1219200" y="2202426"/>
+            <a:ext cx="3647768" cy="489505"/>
+          </a:xfrm>
+        </p:spPr>
+        <p:txBody>
+          <a:bodyPr>
+            <a:noAutofit/>
+          </a:bodyPr>
+          <a:lstStyle/>
+          <a:p>
+            <a:pPr marL="0" indent="0" algn="l" rtl="0">
+              <a:buNone/>
+            </a:pPr>
+            <a:r>
+              <a:rPr lang="en-US" b="1" i="1" dirty="0"/>
+              <a:t>Fitness (q=0.1)</a:t>
+            </a:r>
+          </a:p>
+        </p:txBody>
+      </p:sp>
+      <p:sp>
+        <p:nvSpPr>
+          <p:cNvPr id="8" name="Content Placeholder 2">
+            <a:extLst>
+              <a:ext uri="{FF2B5EF4-FFF2-40B4-BE49-F238E27FC236}">
+                <a16:creationId xmlns:a16="http://schemas.microsoft.com/office/drawing/2014/main" id="{C552588D-D7E0-26AF-4DF1-90CECF0BE492}"/>
+              </a:ext>
+            </a:extLst>
+          </p:cNvPr>
+          <p:cNvSpPr txBox="1">
+            <a:spLocks/>
+          </p:cNvSpPr>
+          <p:nvPr/>
+        </p:nvSpPr>
+        <p:spPr>
+          <a:xfrm>
+            <a:off x="6420465" y="2202425"/>
+            <a:ext cx="5260258" cy="489505"/>
+          </a:xfrm>
+          <a:prstGeom prst="rect">
+            <a:avLst/>
+          </a:prstGeom>
+        </p:spPr>
+        <p:txBody>
+          <a:bodyPr vert="horz" lIns="91440" tIns="45720" rIns="91440" bIns="45720" rtlCol="1">
+            <a:noAutofit/>
+          </a:bodyPr>
+          <a:lstStyle>
+            <a:lvl1pPr marL="228600" indent="-228600" algn="r" defTabSz="914400" rtl="1" eaLnBrk="1" latinLnBrk="0" hangingPunct="1">
+              <a:lnSpc>
+                <a:spcPct val="90000"/>
+              </a:lnSpc>
+              <a:spcBef>
+                <a:spcPts val="1000"/>
+              </a:spcBef>
+              <a:buFont typeface="Arial" panose="020B0604020202020204" pitchFamily="34" charset="0"/>
+              <a:buChar char="•"/>
+              <a:defRPr sz="2800" kern="1200">
+                <a:solidFill>
+                  <a:schemeClr val="tx1"/>
+                </a:solidFill>
+                <a:latin typeface="+mn-lt"/>
+                <a:ea typeface="+mn-ea"/>
+                <a:cs typeface="+mn-cs"/>
+              </a:defRPr>
+            </a:lvl1pPr>
+            <a:lvl2pPr marL="685800" indent="-228600" algn="r" defTabSz="914400" rtl="1" eaLnBrk="1" latinLnBrk="0" hangingPunct="1">
+              <a:lnSpc>
+                <a:spcPct val="90000"/>
+              </a:lnSpc>
+              <a:spcBef>
+                <a:spcPts val="500"/>
+              </a:spcBef>
+              <a:buFont typeface="Arial" panose="020B0604020202020204" pitchFamily="34" charset="0"/>
+              <a:buChar char="•"/>
+              <a:defRPr sz="2400" kern="1200">
+                <a:solidFill>
+                  <a:schemeClr val="tx1"/>
+                </a:solidFill>
+                <a:latin typeface="+mn-lt"/>
+                <a:ea typeface="+mn-ea"/>
+                <a:cs typeface="+mn-cs"/>
+              </a:defRPr>
+            </a:lvl2pPr>
+            <a:lvl3pPr marL="1143000" indent="-228600" algn="r" defTabSz="914400" rtl="1" eaLnBrk="1" latinLnBrk="0" hangingPunct="1">
+              <a:lnSpc>
+                <a:spcPct val="90000"/>
+              </a:lnSpc>
+              <a:spcBef>
+                <a:spcPts val="500"/>
+              </a:spcBef>
+              <a:buFont typeface="Arial" panose="020B0604020202020204" pitchFamily="34" charset="0"/>
+              <a:buChar char="•"/>
+              <a:defRPr sz="2000" kern="1200">
+                <a:solidFill>
+                  <a:schemeClr val="tx1"/>
+                </a:solidFill>
+                <a:latin typeface="+mn-lt"/>
+                <a:ea typeface="+mn-ea"/>
+                <a:cs typeface="+mn-cs"/>
+              </a:defRPr>
+            </a:lvl3pPr>
+            <a:lvl4pPr marL="1600200" indent="-228600" algn="r" defTabSz="914400" rtl="1" eaLnBrk="1" latinLnBrk="0" hangingPunct="1">
+              <a:lnSpc>
+                <a:spcPct val="90000"/>
+              </a:lnSpc>
+              <a:spcBef>
+                <a:spcPts val="500"/>
+              </a:spcBef>
+              <a:buFont typeface="Arial" panose="020B0604020202020204" pitchFamily="34" charset="0"/>
+              <a:buChar char="•"/>
+              <a:defRPr sz="1800" kern="1200">
+                <a:solidFill>
+                  <a:schemeClr val="tx1"/>
+                </a:solidFill>
+                <a:latin typeface="+mn-lt"/>
+                <a:ea typeface="+mn-ea"/>
+                <a:cs typeface="+mn-cs"/>
+              </a:defRPr>
+            </a:lvl4pPr>
+            <a:lvl5pPr marL="2057400" indent="-228600" algn="r" defTabSz="914400" rtl="1" eaLnBrk="1" latinLnBrk="0" hangingPunct="1">
+              <a:lnSpc>
+                <a:spcPct val="90000"/>
+              </a:lnSpc>
+              <a:spcBef>
+                <a:spcPts val="500"/>
+              </a:spcBef>
+              <a:buFont typeface="Arial" panose="020B0604020202020204" pitchFamily="34" charset="0"/>
+              <a:buChar char="•"/>
+              <a:defRPr sz="1800" kern="1200">
+                <a:solidFill>
+                  <a:schemeClr val="tx1"/>
+                </a:solidFill>
+                <a:latin typeface="+mn-lt"/>
+                <a:ea typeface="+mn-ea"/>
+                <a:cs typeface="+mn-cs"/>
+              </a:defRPr>
+            </a:lvl5pPr>
+            <a:lvl6pPr marL="2514600" indent="-228600" algn="r" defTabSz="914400" rtl="1" eaLnBrk="1" latinLnBrk="0" hangingPunct="1">
+              <a:lnSpc>
+                <a:spcPct val="90000"/>
+              </a:lnSpc>
+              <a:spcBef>
+                <a:spcPts val="500"/>
+              </a:spcBef>
+              <a:buFont typeface="Arial" panose="020B0604020202020204" pitchFamily="34" charset="0"/>
+              <a:buChar char="•"/>
+              <a:defRPr sz="1800" kern="1200">
+                <a:solidFill>
+                  <a:schemeClr val="tx1"/>
+                </a:solidFill>
+                <a:latin typeface="+mn-lt"/>
+                <a:ea typeface="+mn-ea"/>
+                <a:cs typeface="+mn-cs"/>
+              </a:defRPr>
+            </a:lvl6pPr>
+            <a:lvl7pPr marL="2971800" indent="-228600" algn="r" defTabSz="914400" rtl="1" eaLnBrk="1" latinLnBrk="0" hangingPunct="1">
+              <a:lnSpc>
+                <a:spcPct val="90000"/>
+              </a:lnSpc>
+              <a:spcBef>
+                <a:spcPts val="500"/>
+              </a:spcBef>
+              <a:buFont typeface="Arial" panose="020B0604020202020204" pitchFamily="34" charset="0"/>
+              <a:buChar char="•"/>
+              <a:defRPr sz="1800" kern="1200">
+                <a:solidFill>
+                  <a:schemeClr val="tx1"/>
+                </a:solidFill>
+                <a:latin typeface="+mn-lt"/>
+                <a:ea typeface="+mn-ea"/>
+                <a:cs typeface="+mn-cs"/>
+              </a:defRPr>
+            </a:lvl7pPr>
+            <a:lvl8pPr marL="3429000" indent="-228600" algn="r" defTabSz="914400" rtl="1" eaLnBrk="1" latinLnBrk="0" hangingPunct="1">
+              <a:lnSpc>
+                <a:spcPct val="90000"/>
+              </a:lnSpc>
+              <a:spcBef>
+                <a:spcPts val="500"/>
+              </a:spcBef>
+              <a:buFont typeface="Arial" panose="020B0604020202020204" pitchFamily="34" charset="0"/>
+              <a:buChar char="•"/>
+              <a:defRPr sz="1800" kern="1200">
+                <a:solidFill>
+                  <a:schemeClr val="tx1"/>
+                </a:solidFill>
+                <a:latin typeface="+mn-lt"/>
+                <a:ea typeface="+mn-ea"/>
+                <a:cs typeface="+mn-cs"/>
+              </a:defRPr>
+            </a:lvl8pPr>
+            <a:lvl9pPr marL="3886200" indent="-228600" algn="r" defTabSz="914400" rtl="1" eaLnBrk="1" latinLnBrk="0" hangingPunct="1">
+              <a:lnSpc>
+                <a:spcPct val="90000"/>
+              </a:lnSpc>
+              <a:spcBef>
+                <a:spcPts val="500"/>
+              </a:spcBef>
+              <a:buFont typeface="Arial" panose="020B0604020202020204" pitchFamily="34" charset="0"/>
+              <a:buChar char="•"/>
+              <a:defRPr sz="1800" kern="1200">
+                <a:solidFill>
+                  <a:schemeClr val="tx1"/>
+                </a:solidFill>
+                <a:latin typeface="+mn-lt"/>
+                <a:ea typeface="+mn-ea"/>
+                <a:cs typeface="+mn-cs"/>
+              </a:defRPr>
+            </a:lvl9pPr>
+          </a:lstStyle>
+          <a:p>
+            <a:pPr marL="0" indent="0" algn="l" rtl="0">
+              <a:buFont typeface="Arial" panose="020B0604020202020204" pitchFamily="34" charset="0"/>
+              <a:buNone/>
+            </a:pPr>
+            <a:r>
+              <a:rPr lang="en-US" b="1" i="1" dirty="0"/>
+              <a:t>Frequency of species (q=0.1)</a:t>
+            </a:r>
+          </a:p>
+        </p:txBody>
+      </p:sp>
+      <p:pic>
+        <p:nvPicPr>
+          <p:cNvPr id="5" name="תמונה 4" descr="תמונה שמכילה טקסט, צילום מסך, תצוגה, מספר&#10;&#10;תוכן שנוצר על-ידי בינה מלאכותית עשוי להיות שגוי.">
+            <a:extLst>
+              <a:ext uri="{FF2B5EF4-FFF2-40B4-BE49-F238E27FC236}">
+                <a16:creationId xmlns:a16="http://schemas.microsoft.com/office/drawing/2014/main" id="{9B364879-0693-81AC-0F1E-C176A5C74D70}"/>
+              </a:ext>
+            </a:extLst>
+          </p:cNvPr>
+          <p:cNvPicPr>
+            <a:picLocks noChangeAspect="1"/>
+          </p:cNvPicPr>
+          <p:nvPr/>
+        </p:nvPicPr>
+        <p:blipFill>
+          <a:blip r:embed="rId2">
+            <a:extLst>
+              <a:ext uri="{28A0092B-C50C-407E-A947-70E740481C1C}">
+                <a14:useLocalDpi xmlns:a14="http://schemas.microsoft.com/office/drawing/2010/main" val="0"/>
+              </a:ext>
+            </a:extLst>
+          </a:blip>
+          <a:srcRect t="7046"/>
+          <a:stretch/>
+        </p:blipFill>
+        <p:spPr>
+          <a:xfrm>
+            <a:off x="6124508" y="2810865"/>
+            <a:ext cx="5852172" cy="4079899"/>
+          </a:xfrm>
+          <a:prstGeom prst="rect">
+            <a:avLst/>
+          </a:prstGeom>
+        </p:spPr>
+      </p:pic>
+      <p:pic>
+        <p:nvPicPr>
+          <p:cNvPr id="9" name="תמונה 8" descr="תמונה שמכילה טקסט, צילום מסך, קו, תצוגה&#10;&#10;תוכן שנוצר על-ידי בינה מלאכותית עשוי להיות שגוי.">
+            <a:extLst>
+              <a:ext uri="{FF2B5EF4-FFF2-40B4-BE49-F238E27FC236}">
+                <a16:creationId xmlns:a16="http://schemas.microsoft.com/office/drawing/2014/main" id="{DEAD0F51-8352-7A60-BAD8-688554DC2F6F}"/>
+              </a:ext>
+            </a:extLst>
+          </p:cNvPr>
+          <p:cNvPicPr>
+            <a:picLocks noChangeAspect="1"/>
+          </p:cNvPicPr>
+          <p:nvPr/>
+        </p:nvPicPr>
+        <p:blipFill>
+          <a:blip r:embed="rId3">
+            <a:extLst>
+              <a:ext uri="{28A0092B-C50C-407E-A947-70E740481C1C}">
+                <a14:useLocalDpi xmlns:a14="http://schemas.microsoft.com/office/drawing/2010/main" val="0"/>
+              </a:ext>
+            </a:extLst>
+          </a:blip>
+          <a:srcRect t="11078"/>
+          <a:stretch/>
+        </p:blipFill>
+        <p:spPr>
+          <a:xfrm>
+            <a:off x="272336" y="2810865"/>
+            <a:ext cx="5852172" cy="3902919"/>
+          </a:xfrm>
+          <a:prstGeom prst="rect">
+            <a:avLst/>
+          </a:prstGeom>
+        </p:spPr>
+      </p:pic>
+    </p:spTree>
+    <p:extLst>
+      <p:ext uri="{BB962C8B-B14F-4D97-AF65-F5344CB8AC3E}">
+        <p14:creationId xmlns:p14="http://schemas.microsoft.com/office/powerpoint/2010/main" val="3925588285"/>
+      </p:ext>
+    </p:extLst>
+  </p:cSld>
+  <p:clrMapOvr>
+    <a:masterClrMapping/>
+  </p:clrMapOvr>
+  <p:timing>
+    <p:tnLst>
+      <p:par>
+        <p:cTn id="1" dur="indefinite" restart="never" nodeType="tmRoot">
+          <p:childTnLst>
+            <p:seq concurrent="1" nextAc="seek">
+              <p:cTn id="2" dur="indefinite" nodeType="mainSeq">
+                <p:childTnLst>
+                  <p:par>
+                    <p:cTn id="3" fill="hold">
+                      <p:stCondLst>
+                        <p:cond delay="indefinite"/>
+                      </p:stCondLst>
+                      <p:childTnLst>
+                        <p:par>
+                          <p:cTn id="4" fill="hold">
+                            <p:stCondLst>
+                              <p:cond delay="0"/>
+                            </p:stCondLst>
+                            <p:childTnLst>
+                              <p:par>
+                                <p:cTn id="5" presetID="1" presetClass="entr" presetSubtype="0" fill="hold" grpId="0" nodeType="clickEffect">
+                                  <p:stCondLst>
+                                    <p:cond delay="0"/>
+                                  </p:stCondLst>
+                                  <p:childTnLst>
+                                    <p:set>
+                                      <p:cBhvr>
+                                        <p:cTn id="6" dur="1" fill="hold">
+                                          <p:stCondLst>
+                                            <p:cond delay="0"/>
+                                          </p:stCondLst>
+                                        </p:cTn>
+                                        <p:tgtEl>
+                                          <p:spTgt spid="7">
+                                            <p:txEl>
+                                              <p:pRg st="0" end="0"/>
+                                            </p:txEl>
+                                          </p:spTgt>
+                                        </p:tgtEl>
+                                        <p:attrNameLst>
+                                          <p:attrName>style.visibility</p:attrName>
+                                        </p:attrNameLst>
+                                      </p:cBhvr>
+                                      <p:to>
+                                        <p:strVal val="visible"/>
+                                      </p:to>
+                                    </p:set>
+                                  </p:childTnLst>
+                                </p:cTn>
+                              </p:par>
+                            </p:childTnLst>
+                          </p:cTn>
+                        </p:par>
+                      </p:childTnLst>
+                    </p:cTn>
+                  </p:par>
+                  <p:par>
+                    <p:cTn id="7" fill="hold">
+                      <p:stCondLst>
+                        <p:cond delay="indefinite"/>
+                      </p:stCondLst>
+                      <p:childTnLst>
+                        <p:par>
+                          <p:cTn id="8" fill="hold">
+                            <p:stCondLst>
+                              <p:cond delay="0"/>
+                            </p:stCondLst>
+                            <p:childTnLst>
+                              <p:par>
+                                <p:cTn id="9" presetID="1" presetClass="entr" presetSubtype="0" fill="hold" grpId="0" nodeType="clickEffect">
+                                  <p:stCondLst>
+                                    <p:cond delay="0"/>
+                                  </p:stCondLst>
+                                  <p:childTnLst>
+                                    <p:set>
+                                      <p:cBhvr>
+                                        <p:cTn id="10" dur="1" fill="hold">
+                                          <p:stCondLst>
+                                            <p:cond delay="0"/>
+                                          </p:stCondLst>
+                                        </p:cTn>
+                                        <p:tgtEl>
+                                          <p:spTgt spid="8">
+                                            <p:txEl>
+                                              <p:pRg st="0" end="0"/>
+                                            </p:txEl>
+                                          </p:spTgt>
+                                        </p:tgtEl>
+                                        <p:attrNameLst>
+                                          <p:attrName>style.visibility</p:attrName>
+                                        </p:attrNameLst>
+                                      </p:cBhvr>
+                                      <p:to>
+                                        <p:strVal val="visible"/>
+                                      </p:to>
+                                    </p:set>
+                                  </p:childTnLst>
+                                </p:cTn>
+                              </p:par>
+                            </p:childTnLst>
+                          </p:cTn>
+                        </p:par>
+                      </p:childTnLst>
+                    </p:cTn>
+                  </p:par>
+                </p:childTnLst>
+              </p:cTn>
+              <p:prevCondLst>
+                <p:cond evt="onPrev" delay="0">
+                  <p:tgtEl>
+                    <p:sldTgt/>
+                  </p:tgtEl>
+                </p:cond>
+              </p:prevCondLst>
+              <p:nextCondLst>
+                <p:cond evt="onNext" delay="0">
+                  <p:tgtEl>
+                    <p:sldTgt/>
+                  </p:tgtEl>
+                </p:cond>
+              </p:nextCondLst>
+            </p:seq>
+          </p:childTnLst>
+        </p:cTn>
+      </p:par>
+    </p:tnLst>
+    <p:bldLst>
+      <p:bldP spid="7" grpId="0" uiExpand="1" build="p"/>
+      <p:bldP spid="8" grpId="0" uiExpand="1" build="p"/>
+    </p:bldLst>
+  </p:timing>
+</p:sld>
+</file>
+
+<file path=ppt/slides/slide7.xml><?xml version="1.0" encoding="utf-8"?>
+<p:sld xmlns:a="http://schemas.openxmlformats.org/drawingml/2006/main" xmlns:r="http://schemas.openxmlformats.org/officeDocument/2006/relationships" xmlns:p="http://schemas.openxmlformats.org/presentationml/2006/main">
+  <p:cSld>
+    <p:spTree>
+      <p:nvGrpSpPr>
+        <p:cNvPr id="1" name="">
+          <a:extLst>
+            <a:ext uri="{FF2B5EF4-FFF2-40B4-BE49-F238E27FC236}">
+              <a16:creationId xmlns:a16="http://schemas.microsoft.com/office/drawing/2014/main" id="{437D6979-A15B-EB82-7739-A0BCB4ED0DFA}"/>
+            </a:ext>
+          </a:extLst>
+        </p:cNvPr>
+        <p:cNvGrpSpPr/>
+        <p:nvPr/>
+      </p:nvGrpSpPr>
+      <p:grpSpPr>
+        <a:xfrm>
+          <a:off x="0" y="0"/>
+          <a:ext cx="0" cy="0"/>
+          <a:chOff x="0" y="0"/>
+          <a:chExt cx="0" cy="0"/>
+        </a:xfrm>
+      </p:grpSpPr>
+      <p:sp>
+        <p:nvSpPr>
+          <p:cNvPr id="4" name="Title 1">
+            <a:extLst>
+              <a:ext uri="{FF2B5EF4-FFF2-40B4-BE49-F238E27FC236}">
+                <a16:creationId xmlns:a16="http://schemas.microsoft.com/office/drawing/2014/main" id="{15FA16D1-C255-02B1-C39B-D9A7A084E3DD}"/>
+              </a:ext>
+            </a:extLst>
+          </p:cNvPr>
+          <p:cNvSpPr txBox="1">
+            <a:spLocks/>
+          </p:cNvSpPr>
+          <p:nvPr/>
+        </p:nvSpPr>
+        <p:spPr>
+          <a:xfrm>
+            <a:off x="990600" y="517525"/>
+            <a:ext cx="10515600" cy="1325563"/>
+          </a:xfrm>
+          <a:prstGeom prst="rect">
+            <a:avLst/>
+          </a:prstGeom>
+        </p:spPr>
+        <p:txBody>
+          <a:bodyPr vert="horz" lIns="91440" tIns="45720" rIns="91440" bIns="45720" rtlCol="1" anchor="ctr">
+            <a:normAutofit/>
+          </a:bodyPr>
+          <a:lstStyle>
+            <a:lvl1pPr algn="r" defTabSz="914400" rtl="1" eaLnBrk="1" latinLnBrk="0" hangingPunct="1">
+              <a:lnSpc>
+                <a:spcPct val="90000"/>
+              </a:lnSpc>
+              <a:spcBef>
+                <a:spcPct val="0"/>
+              </a:spcBef>
+              <a:buNone/>
+              <a:defRPr sz="4400" kern="1200">
+                <a:solidFill>
+                  <a:schemeClr val="tx1"/>
+                </a:solidFill>
+                <a:latin typeface="+mj-lt"/>
+                <a:ea typeface="+mj-ea"/>
+                <a:cs typeface="+mj-cs"/>
+              </a:defRPr>
+            </a:lvl1pPr>
+          </a:lstStyle>
+          <a:p>
+            <a:pPr algn="ctr" rtl="0"/>
+            <a:r>
+              <a:rPr lang="en-US" dirty="0">
+                <a:solidFill>
+                  <a:srgbClr val="0070C0"/>
+                </a:solidFill>
+                <a:effectLst>
+                  <a:outerShdw blurRad="38100" dist="38100" dir="2700000" algn="tl">
+                    <a:srgbClr val="000000">
+                      <a:alpha val="43137"/>
+                    </a:srgbClr>
+                  </a:outerShdw>
+                </a:effectLst>
+                <a:latin typeface="Comic Sans MS" panose="030F0702030302020204" pitchFamily="66" charset="0"/>
+                <a:ea typeface="+mn-ea"/>
+                <a:cs typeface="+mn-cs"/>
+              </a:rPr>
+              <a:t>Fixed average fitness depends on mutation rate</a:t>
+            </a:r>
+            <a:endParaRPr lang="en-US" dirty="0"/>
+          </a:p>
+        </p:txBody>
+      </p:sp>
+      <p:sp>
+        <p:nvSpPr>
+          <p:cNvPr id="7" name="Content Placeholder 2">
+            <a:extLst>
+              <a:ext uri="{FF2B5EF4-FFF2-40B4-BE49-F238E27FC236}">
+                <a16:creationId xmlns:a16="http://schemas.microsoft.com/office/drawing/2014/main" id="{95BA1641-D752-1ED6-B688-3599B93F4E2A}"/>
+              </a:ext>
+            </a:extLst>
+          </p:cNvPr>
+          <p:cNvSpPr>
+            <a:spLocks noGrp="1"/>
+          </p:cNvSpPr>
+          <p:nvPr>
+            <p:ph idx="1"/>
+          </p:nvPr>
+        </p:nvSpPr>
+        <p:spPr>
+          <a:xfrm>
+            <a:off x="1219200" y="2202426"/>
+            <a:ext cx="3647768" cy="489505"/>
+          </a:xfrm>
+        </p:spPr>
+        <p:txBody>
+          <a:bodyPr>
+            <a:noAutofit/>
+          </a:bodyPr>
+          <a:lstStyle/>
+          <a:p>
+            <a:pPr marL="0" indent="0" algn="l" rtl="0">
+              <a:buNone/>
+            </a:pPr>
+            <a:r>
+              <a:rPr lang="en-US" b="1" i="1" dirty="0"/>
+              <a:t>Fitness (q=0.33)</a:t>
+            </a:r>
+          </a:p>
+        </p:txBody>
+      </p:sp>
+      <p:sp>
+        <p:nvSpPr>
+          <p:cNvPr id="8" name="Content Placeholder 2">
+            <a:extLst>
+              <a:ext uri="{FF2B5EF4-FFF2-40B4-BE49-F238E27FC236}">
+                <a16:creationId xmlns:a16="http://schemas.microsoft.com/office/drawing/2014/main" id="{CCB48892-2A27-8228-45C7-AFBEFF94A7B2}"/>
+              </a:ext>
+            </a:extLst>
+          </p:cNvPr>
+          <p:cNvSpPr txBox="1">
+            <a:spLocks/>
+          </p:cNvSpPr>
+          <p:nvPr/>
+        </p:nvSpPr>
+        <p:spPr>
+          <a:xfrm>
+            <a:off x="6420465" y="2202425"/>
+            <a:ext cx="5260258" cy="489505"/>
+          </a:xfrm>
+          <a:prstGeom prst="rect">
+            <a:avLst/>
+          </a:prstGeom>
+        </p:spPr>
+        <p:txBody>
+          <a:bodyPr vert="horz" lIns="91440" tIns="45720" rIns="91440" bIns="45720" rtlCol="1">
+            <a:noAutofit/>
+          </a:bodyPr>
+          <a:lstStyle>
+            <a:lvl1pPr marL="228600" indent="-228600" algn="r" defTabSz="914400" rtl="1" eaLnBrk="1" latinLnBrk="0" hangingPunct="1">
+              <a:lnSpc>
+                <a:spcPct val="90000"/>
+              </a:lnSpc>
+              <a:spcBef>
+                <a:spcPts val="1000"/>
+              </a:spcBef>
+              <a:buFont typeface="Arial" panose="020B0604020202020204" pitchFamily="34" charset="0"/>
+              <a:buChar char="•"/>
+              <a:defRPr sz="2800" kern="1200">
+                <a:solidFill>
+                  <a:schemeClr val="tx1"/>
+                </a:solidFill>
+                <a:latin typeface="+mn-lt"/>
+                <a:ea typeface="+mn-ea"/>
+                <a:cs typeface="+mn-cs"/>
+              </a:defRPr>
+            </a:lvl1pPr>
+            <a:lvl2pPr marL="685800" indent="-228600" algn="r" defTabSz="914400" rtl="1" eaLnBrk="1" latinLnBrk="0" hangingPunct="1">
+              <a:lnSpc>
+                <a:spcPct val="90000"/>
+              </a:lnSpc>
+              <a:spcBef>
+                <a:spcPts val="500"/>
+              </a:spcBef>
+              <a:buFont typeface="Arial" panose="020B0604020202020204" pitchFamily="34" charset="0"/>
+              <a:buChar char="•"/>
+              <a:defRPr sz="2400" kern="1200">
+                <a:solidFill>
+                  <a:schemeClr val="tx1"/>
+                </a:solidFill>
+                <a:latin typeface="+mn-lt"/>
+                <a:ea typeface="+mn-ea"/>
+                <a:cs typeface="+mn-cs"/>
+              </a:defRPr>
+            </a:lvl2pPr>
+            <a:lvl3pPr marL="1143000" indent="-228600" algn="r" defTabSz="914400" rtl="1" eaLnBrk="1" latinLnBrk="0" hangingPunct="1">
+              <a:lnSpc>
+                <a:spcPct val="90000"/>
+              </a:lnSpc>
+              <a:spcBef>
+                <a:spcPts val="500"/>
+              </a:spcBef>
+              <a:buFont typeface="Arial" panose="020B0604020202020204" pitchFamily="34" charset="0"/>
+              <a:buChar char="•"/>
+              <a:defRPr sz="2000" kern="1200">
+                <a:solidFill>
+                  <a:schemeClr val="tx1"/>
+                </a:solidFill>
+                <a:latin typeface="+mn-lt"/>
+                <a:ea typeface="+mn-ea"/>
+                <a:cs typeface="+mn-cs"/>
+              </a:defRPr>
+            </a:lvl3pPr>
+            <a:lvl4pPr marL="1600200" indent="-228600" algn="r" defTabSz="914400" rtl="1" eaLnBrk="1" latinLnBrk="0" hangingPunct="1">
+              <a:lnSpc>
+                <a:spcPct val="90000"/>
+              </a:lnSpc>
+              <a:spcBef>
+                <a:spcPts val="500"/>
+              </a:spcBef>
+              <a:buFont typeface="Arial" panose="020B0604020202020204" pitchFamily="34" charset="0"/>
+              <a:buChar char="•"/>
+              <a:defRPr sz="1800" kern="1200">
+                <a:solidFill>
+                  <a:schemeClr val="tx1"/>
+                </a:solidFill>
+                <a:latin typeface="+mn-lt"/>
+                <a:ea typeface="+mn-ea"/>
+                <a:cs typeface="+mn-cs"/>
+              </a:defRPr>
+            </a:lvl4pPr>
+            <a:lvl5pPr marL="2057400" indent="-228600" algn="r" defTabSz="914400" rtl="1" eaLnBrk="1" latinLnBrk="0" hangingPunct="1">
+              <a:lnSpc>
+                <a:spcPct val="90000"/>
+              </a:lnSpc>
+              <a:spcBef>
+                <a:spcPts val="500"/>
+              </a:spcBef>
+              <a:buFont typeface="Arial" panose="020B0604020202020204" pitchFamily="34" charset="0"/>
+              <a:buChar char="•"/>
+              <a:defRPr sz="1800" kern="1200">
+                <a:solidFill>
+                  <a:schemeClr val="tx1"/>
+                </a:solidFill>
+                <a:latin typeface="+mn-lt"/>
+                <a:ea typeface="+mn-ea"/>
+                <a:cs typeface="+mn-cs"/>
+              </a:defRPr>
+            </a:lvl5pPr>
+            <a:lvl6pPr marL="2514600" indent="-228600" algn="r" defTabSz="914400" rtl="1" eaLnBrk="1" latinLnBrk="0" hangingPunct="1">
+              <a:lnSpc>
+                <a:spcPct val="90000"/>
+              </a:lnSpc>
+              <a:spcBef>
+                <a:spcPts val="500"/>
+              </a:spcBef>
+              <a:buFont typeface="Arial" panose="020B0604020202020204" pitchFamily="34" charset="0"/>
+              <a:buChar char="•"/>
+              <a:defRPr sz="1800" kern="1200">
+                <a:solidFill>
+                  <a:schemeClr val="tx1"/>
+                </a:solidFill>
+                <a:latin typeface="+mn-lt"/>
+                <a:ea typeface="+mn-ea"/>
+                <a:cs typeface="+mn-cs"/>
+              </a:defRPr>
+            </a:lvl6pPr>
+            <a:lvl7pPr marL="2971800" indent="-228600" algn="r" defTabSz="914400" rtl="1" eaLnBrk="1" latinLnBrk="0" hangingPunct="1">
+              <a:lnSpc>
+                <a:spcPct val="90000"/>
+              </a:lnSpc>
+              <a:spcBef>
+                <a:spcPts val="500"/>
+              </a:spcBef>
+              <a:buFont typeface="Arial" panose="020B0604020202020204" pitchFamily="34" charset="0"/>
+              <a:buChar char="•"/>
+              <a:defRPr sz="1800" kern="1200">
+                <a:solidFill>
+                  <a:schemeClr val="tx1"/>
+                </a:solidFill>
+                <a:latin typeface="+mn-lt"/>
+                <a:ea typeface="+mn-ea"/>
+                <a:cs typeface="+mn-cs"/>
+              </a:defRPr>
+            </a:lvl7pPr>
+            <a:lvl8pPr marL="3429000" indent="-228600" algn="r" defTabSz="914400" rtl="1" eaLnBrk="1" latinLnBrk="0" hangingPunct="1">
+              <a:lnSpc>
+                <a:spcPct val="90000"/>
+              </a:lnSpc>
+              <a:spcBef>
+                <a:spcPts val="500"/>
+              </a:spcBef>
+              <a:buFont typeface="Arial" panose="020B0604020202020204" pitchFamily="34" charset="0"/>
+              <a:buChar char="•"/>
+              <a:defRPr sz="1800" kern="1200">
+                <a:solidFill>
+                  <a:schemeClr val="tx1"/>
+                </a:solidFill>
+                <a:latin typeface="+mn-lt"/>
+                <a:ea typeface="+mn-ea"/>
+                <a:cs typeface="+mn-cs"/>
+              </a:defRPr>
+            </a:lvl8pPr>
+            <a:lvl9pPr marL="3886200" indent="-228600" algn="r" defTabSz="914400" rtl="1" eaLnBrk="1" latinLnBrk="0" hangingPunct="1">
+              <a:lnSpc>
+                <a:spcPct val="90000"/>
+              </a:lnSpc>
+              <a:spcBef>
+                <a:spcPts val="500"/>
+              </a:spcBef>
+              <a:buFont typeface="Arial" panose="020B0604020202020204" pitchFamily="34" charset="0"/>
+              <a:buChar char="•"/>
+              <a:defRPr sz="1800" kern="1200">
+                <a:solidFill>
+                  <a:schemeClr val="tx1"/>
+                </a:solidFill>
+                <a:latin typeface="+mn-lt"/>
+                <a:ea typeface="+mn-ea"/>
+                <a:cs typeface="+mn-cs"/>
+              </a:defRPr>
+            </a:lvl9pPr>
+          </a:lstStyle>
+          <a:p>
+            <a:pPr marL="0" indent="0" algn="l" rtl="0">
+              <a:buFont typeface="Arial" panose="020B0604020202020204" pitchFamily="34" charset="0"/>
+              <a:buNone/>
+            </a:pPr>
+            <a:r>
+              <a:rPr lang="en-US" b="1" i="1" dirty="0"/>
+              <a:t>Frequency of species (q=0.33)</a:t>
+            </a:r>
+          </a:p>
+        </p:txBody>
+      </p:sp>
+      <p:pic>
+        <p:nvPicPr>
+          <p:cNvPr id="3" name="תמונה 2" descr="תמונה שמכילה טקסט, צילום מסך, מלבן, תרשים&#10;&#10;תוכן שנוצר על-ידי בינה מלאכותית עשוי להיות שגוי.">
+            <a:extLst>
+              <a:ext uri="{FF2B5EF4-FFF2-40B4-BE49-F238E27FC236}">
+                <a16:creationId xmlns:a16="http://schemas.microsoft.com/office/drawing/2014/main" id="{086C9D95-B487-AE2A-0D90-52C47094A93E}"/>
+              </a:ext>
+            </a:extLst>
+          </p:cNvPr>
+          <p:cNvPicPr>
+            <a:picLocks noChangeAspect="1"/>
+          </p:cNvPicPr>
+          <p:nvPr/>
+        </p:nvPicPr>
+        <p:blipFill>
+          <a:blip r:embed="rId2">
+            <a:extLst>
+              <a:ext uri="{28A0092B-C50C-407E-A947-70E740481C1C}">
+                <a14:useLocalDpi xmlns:a14="http://schemas.microsoft.com/office/drawing/2010/main" val="0"/>
+              </a:ext>
+            </a:extLst>
+          </a:blip>
+          <a:srcRect t="11078"/>
+          <a:stretch/>
+        </p:blipFill>
+        <p:spPr>
+          <a:xfrm>
+            <a:off x="243828" y="2774173"/>
+            <a:ext cx="5852172" cy="3902919"/>
+          </a:xfrm>
+          <a:prstGeom prst="rect">
+            <a:avLst/>
+          </a:prstGeom>
+        </p:spPr>
+      </p:pic>
+      <p:pic>
+        <p:nvPicPr>
+          <p:cNvPr id="10" name="תמונה 9" descr="תמונה שמכילה טקסט, צילום מסך, תרשים, קו&#10;&#10;תוכן שנוצר על-ידי בינה מלאכותית עשוי להיות שגוי.">
+            <a:extLst>
+              <a:ext uri="{FF2B5EF4-FFF2-40B4-BE49-F238E27FC236}">
+                <a16:creationId xmlns:a16="http://schemas.microsoft.com/office/drawing/2014/main" id="{8E04D6A1-633E-086F-03E6-BE0D473AA17C}"/>
+              </a:ext>
+            </a:extLst>
+          </p:cNvPr>
+          <p:cNvPicPr>
+            <a:picLocks noChangeAspect="1"/>
+          </p:cNvPicPr>
+          <p:nvPr/>
+        </p:nvPicPr>
+        <p:blipFill>
+          <a:blip r:embed="rId3">
+            <a:extLst>
+              <a:ext uri="{28A0092B-C50C-407E-A947-70E740481C1C}">
+                <a14:useLocalDpi xmlns:a14="http://schemas.microsoft.com/office/drawing/2010/main" val="0"/>
+              </a:ext>
+            </a:extLst>
+          </a:blip>
+          <a:srcRect t="7046"/>
+          <a:stretch/>
+        </p:blipFill>
+        <p:spPr>
+          <a:xfrm>
+            <a:off x="6339828" y="2746785"/>
+            <a:ext cx="5852172" cy="4079899"/>
+          </a:xfrm>
+          <a:prstGeom prst="rect">
+            <a:avLst/>
+          </a:prstGeom>
+        </p:spPr>
+      </p:pic>
+    </p:spTree>
+    <p:extLst>
+      <p:ext uri="{BB962C8B-B14F-4D97-AF65-F5344CB8AC3E}">
+        <p14:creationId xmlns:p14="http://schemas.microsoft.com/office/powerpoint/2010/main" val="803746649"/>
+      </p:ext>
+    </p:extLst>
+  </p:cSld>
+  <p:clrMapOvr>
+    <a:masterClrMapping/>
+  </p:clrMapOvr>
+  <p:timing>
+    <p:tnLst>
+      <p:par>
+        <p:cTn id="1" dur="indefinite" restart="never" nodeType="tmRoot">
+          <p:childTnLst>
+            <p:seq concurrent="1" nextAc="seek">
+              <p:cTn id="2" dur="indefinite" nodeType="mainSeq">
+                <p:childTnLst>
+                  <p:par>
+                    <p:cTn id="3" fill="hold">
+                      <p:stCondLst>
+                        <p:cond delay="indefinite"/>
+                      </p:stCondLst>
+                      <p:childTnLst>
+                        <p:par>
+                          <p:cTn id="4" fill="hold">
+                            <p:stCondLst>
+                              <p:cond delay="0"/>
+                            </p:stCondLst>
+                            <p:childTnLst>
+                              <p:par>
+                                <p:cTn id="5" presetID="1" presetClass="entr" presetSubtype="0" fill="hold" grpId="0" nodeType="clickEffect">
+                                  <p:stCondLst>
+                                    <p:cond delay="0"/>
+                                  </p:stCondLst>
+                                  <p:childTnLst>
+                                    <p:set>
+                                      <p:cBhvr>
+                                        <p:cTn id="6" dur="1" fill="hold">
+                                          <p:stCondLst>
+                                            <p:cond delay="0"/>
+                                          </p:stCondLst>
+                                        </p:cTn>
+                                        <p:tgtEl>
+                                          <p:spTgt spid="7">
+                                            <p:txEl>
+                                              <p:pRg st="0" end="0"/>
+                                            </p:txEl>
+                                          </p:spTgt>
+                                        </p:tgtEl>
+                                        <p:attrNameLst>
+                                          <p:attrName>style.visibility</p:attrName>
+                                        </p:attrNameLst>
+                                      </p:cBhvr>
+                                      <p:to>
+                                        <p:strVal val="visible"/>
+                                      </p:to>
+                                    </p:set>
+                                  </p:childTnLst>
+                                </p:cTn>
+                              </p:par>
+                            </p:childTnLst>
+                          </p:cTn>
+                        </p:par>
+                      </p:childTnLst>
+                    </p:cTn>
+                  </p:par>
+                  <p:par>
+                    <p:cTn id="7" fill="hold">
+                      <p:stCondLst>
+                        <p:cond delay="indefinite"/>
+                      </p:stCondLst>
+                      <p:childTnLst>
+                        <p:par>
+                          <p:cTn id="8" fill="hold">
+                            <p:stCondLst>
+                              <p:cond delay="0"/>
+                            </p:stCondLst>
+                            <p:childTnLst>
+                              <p:par>
+                                <p:cTn id="9" presetID="1" presetClass="entr" presetSubtype="0" fill="hold" grpId="0" nodeType="clickEffect">
+                                  <p:stCondLst>
+                                    <p:cond delay="0"/>
+                                  </p:stCondLst>
+                                  <p:childTnLst>
+                                    <p:set>
+                                      <p:cBhvr>
+                                        <p:cTn id="10" dur="1" fill="hold">
+                                          <p:stCondLst>
+                                            <p:cond delay="0"/>
+                                          </p:stCondLst>
+                                        </p:cTn>
+                                        <p:tgtEl>
+                                          <p:spTgt spid="8">
+                                            <p:txEl>
+                                              <p:pRg st="0" end="0"/>
+                                            </p:txEl>
+                                          </p:spTgt>
+                                        </p:tgtEl>
+                                        <p:attrNameLst>
+                                          <p:attrName>style.visibility</p:attrName>
+                                        </p:attrNameLst>
+                                      </p:cBhvr>
+                                      <p:to>
+                                        <p:strVal val="visible"/>
+                                      </p:to>
+                                    </p:set>
+                                  </p:childTnLst>
+                                </p:cTn>
+                              </p:par>
+                            </p:childTnLst>
+                          </p:cTn>
+                        </p:par>
+                      </p:childTnLst>
+                    </p:cTn>
+                  </p:par>
+                </p:childTnLst>
+              </p:cTn>
+              <p:prevCondLst>
+                <p:cond evt="onPrev" delay="0">
+                  <p:tgtEl>
+                    <p:sldTgt/>
+                  </p:tgtEl>
+                </p:cond>
+              </p:prevCondLst>
+              <p:nextCondLst>
+                <p:cond evt="onNext" delay="0">
+                  <p:tgtEl>
+                    <p:sldTgt/>
+                  </p:tgtEl>
+                </p:cond>
+              </p:nextCondLst>
+            </p:seq>
+          </p:childTnLst>
+        </p:cTn>
+      </p:par>
+    </p:tnLst>
+    <p:bldLst>
+      <p:bldP spid="7" grpId="0" uiExpand="1" build="p"/>
+      <p:bldP spid="8" grpId="0" uiExpand="1" build="p"/>
+    </p:bldLst>
+  </p:timing>
+</p:sld>
+</file>
+
+<file path=ppt/slides/slide8.xml><?xml version="1.0" encoding="utf-8"?>
+<p:sld xmlns:a="http://schemas.openxmlformats.org/drawingml/2006/main" xmlns:r="http://schemas.openxmlformats.org/officeDocument/2006/relationships" xmlns:p="http://schemas.openxmlformats.org/presentationml/2006/main">
+  <p:cSld>
+    <p:bg>
+      <p:bgPr>
+        <a:solidFill>
+          <a:schemeClr val="bg1"/>
+        </a:solidFill>
+        <a:effectLst/>
+      </p:bgPr>
+    </p:bg>
+    <p:spTree>
+      <p:nvGrpSpPr>
+        <p:cNvPr id="1" name="">
+          <a:extLst>
+            <a:ext uri="{FF2B5EF4-FFF2-40B4-BE49-F238E27FC236}">
+              <a16:creationId xmlns:a16="http://schemas.microsoft.com/office/drawing/2014/main" id="{5507D5CB-53E5-BEC7-F247-5F65C8F73249}"/>
+            </a:ext>
+          </a:extLst>
+        </p:cNvPr>
+        <p:cNvGrpSpPr/>
+        <p:nvPr/>
+      </p:nvGrpSpPr>
+      <p:grpSpPr>
+        <a:xfrm>
+          <a:off x="0" y="0"/>
+          <a:ext cx="0" cy="0"/>
+          <a:chOff x="0" y="0"/>
+          <a:chExt cx="0" cy="0"/>
+        </a:xfrm>
+      </p:grpSpPr>
+      <p:sp useBgFill="1">
+        <p:nvSpPr>
+          <p:cNvPr id="1031" name="Rectangle 1030">
+            <a:extLst>
+              <a:ext uri="{FF2B5EF4-FFF2-40B4-BE49-F238E27FC236}">
+                <a16:creationId xmlns:a16="http://schemas.microsoft.com/office/drawing/2014/main" id="{22F15A2D-2324-487D-A02A-BF46C5C580EB}"/>
+              </a:ext>
+              <a:ext uri="{C183D7F6-B498-43B3-948B-1728B52AA6E4}">
+                <adec:decorative xmlns:adec="http://schemas.microsoft.com/office/drawing/2017/decorative" val="1"/>
+              </a:ext>
+            </a:extLst>
+          </p:cNvPr>
+          <p:cNvSpPr>
+            <a:spLocks noGrp="1" noRot="1" noChangeAspect="1" noMove="1" noResize="1" noEditPoints="1" noAdjustHandles="1" noChangeArrowheads="1" noChangeShapeType="1" noTextEdit="1"/>
+          </p:cNvSpPr>
+          <p:nvPr>
+            <p:extLst>
+              <p:ext uri="{386F3935-93C4-4BCD-93E2-E3B085C9AB24}">
+                <p16:designElem xmlns:p16="http://schemas.microsoft.com/office/powerpoint/2015/main" val="1"/>
+              </p:ext>
+            </p:extLst>
+          </p:nvPr>
+        </p:nvSpPr>
+        <p:spPr>
+          <a:xfrm>
+            <a:off x="0" y="0"/>
+            <a:ext cx="12192000" cy="6858000"/>
+          </a:xfrm>
+          <a:prstGeom prst="rect">
+            <a:avLst/>
+          </a:prstGeom>
+          <a:ln>
+            <a:noFill/>
+          </a:ln>
+        </p:spPr>
+        <p:style>
+          <a:lnRef idx="2">
+            <a:schemeClr val="accent1">
+              <a:shade val="50000"/>
+            </a:schemeClr>
+          </a:lnRef>
+          <a:fillRef idx="1">
+            <a:schemeClr val="accent1"/>
+          </a:fillRef>
+          <a:effectRef idx="0">
+            <a:schemeClr val="accent1"/>
+          </a:effectRef>
+          <a:fontRef idx="minor">
+            <a:schemeClr val="lt1"/>
+          </a:fontRef>
+        </p:style>
+        <p:txBody>
+          <a:bodyPr rtlCol="0" anchor="ctr"/>
+          <a:lstStyle/>
+          <a:p>
+            <a:pPr algn="ctr"/>
+            <a:endParaRPr lang="en-US"/>
+          </a:p>
+        </p:txBody>
+      </p:sp>
+      <p:sp>
+        <p:nvSpPr>
+          <p:cNvPr id="1033" name="Freeform: Shape 1032">
+            <a:extLst>
+              <a:ext uri="{FF2B5EF4-FFF2-40B4-BE49-F238E27FC236}">
+                <a16:creationId xmlns:a16="http://schemas.microsoft.com/office/drawing/2014/main" id="{17A7F34E-D418-47E2-9F86-2C45BBC31210}"/>
+              </a:ext>
+              <a:ext uri="{C183D7F6-B498-43B3-948B-1728B52AA6E4}">
+                <adec:decorative xmlns:adec="http://schemas.microsoft.com/office/drawing/2017/decorative" val="1"/>
+              </a:ext>
+            </a:extLst>
+          </p:cNvPr>
+          <p:cNvSpPr>
+            <a:spLocks noGrp="1" noRot="1" noChangeAspect="1" noMove="1" noResize="1" noEditPoints="1" noAdjustHandles="1" noChangeArrowheads="1" noChangeShapeType="1" noTextEdit="1"/>
+          </p:cNvSpPr>
+          <p:nvPr>
+            <p:extLst>
+              <p:ext uri="{386F3935-93C4-4BCD-93E2-E3B085C9AB24}">
+                <p16:designElem xmlns:p16="http://schemas.microsoft.com/office/powerpoint/2015/main" val="1"/>
+              </p:ext>
+            </p:extLst>
+          </p:nvPr>
+        </p:nvSpPr>
+        <p:spPr>
+          <a:xfrm>
+            <a:off x="321732" y="321733"/>
+            <a:ext cx="11546828" cy="6214534"/>
+          </a:xfrm>
+          <a:custGeom>
+            <a:avLst/>
+            <a:gdLst>
+              <a:gd name="connsiteX0" fmla="*/ 0 w 11546828"/>
+              <a:gd name="connsiteY0" fmla="*/ 0 h 6214534"/>
+              <a:gd name="connsiteX1" fmla="*/ 7965430 w 11546828"/>
+              <a:gd name="connsiteY1" fmla="*/ 0 h 6214534"/>
+              <a:gd name="connsiteX2" fmla="*/ 7965430 w 11546828"/>
+              <a:gd name="connsiteY2" fmla="*/ 1786 h 6214534"/>
+              <a:gd name="connsiteX3" fmla="*/ 11546828 w 11546828"/>
+              <a:gd name="connsiteY3" fmla="*/ 1786 h 6214534"/>
+              <a:gd name="connsiteX4" fmla="*/ 11546828 w 11546828"/>
+              <a:gd name="connsiteY4" fmla="*/ 2866740 h 6214534"/>
+              <a:gd name="connsiteX5" fmla="*/ 11225095 w 11546828"/>
+              <a:gd name="connsiteY5" fmla="*/ 3179536 h 6214534"/>
+              <a:gd name="connsiteX6" fmla="*/ 11225095 w 11546828"/>
+              <a:gd name="connsiteY6" fmla="*/ 301542 h 6214534"/>
+              <a:gd name="connsiteX7" fmla="*/ 320042 w 11546828"/>
+              <a:gd name="connsiteY7" fmla="*/ 301542 h 6214534"/>
+              <a:gd name="connsiteX8" fmla="*/ 320042 w 11546828"/>
+              <a:gd name="connsiteY8" fmla="*/ 5909424 h 6214534"/>
+              <a:gd name="connsiteX9" fmla="*/ 8417210 w 11546828"/>
+              <a:gd name="connsiteY9" fmla="*/ 5909424 h 6214534"/>
+              <a:gd name="connsiteX10" fmla="*/ 8103383 w 11546828"/>
+              <a:gd name="connsiteY10" fmla="*/ 6214534 h 6214534"/>
+              <a:gd name="connsiteX11" fmla="*/ 7222929 w 11546828"/>
+              <a:gd name="connsiteY11" fmla="*/ 6214534 h 6214534"/>
+              <a:gd name="connsiteX12" fmla="*/ 7222929 w 11546828"/>
+              <a:gd name="connsiteY12" fmla="*/ 6212748 h 6214534"/>
+              <a:gd name="connsiteX13" fmla="*/ 0 w 11546828"/>
+              <a:gd name="connsiteY13" fmla="*/ 6212748 h 6214534"/>
+            </a:gdLst>
+            <a:ahLst/>
+            <a:cxnLst>
+              <a:cxn ang="0">
+                <a:pos x="connsiteX0" y="connsiteY0"/>
+              </a:cxn>
+              <a:cxn ang="0">
+                <a:pos x="connsiteX1" y="connsiteY1"/>
+              </a:cxn>
+              <a:cxn ang="0">
+                <a:pos x="connsiteX2" y="connsiteY2"/>
+              </a:cxn>
+              <a:cxn ang="0">
+                <a:pos x="connsiteX3" y="connsiteY3"/>
+              </a:cxn>
+              <a:cxn ang="0">
+                <a:pos x="connsiteX4" y="connsiteY4"/>
+              </a:cxn>
+              <a:cxn ang="0">
+                <a:pos x="connsiteX5" y="connsiteY5"/>
+              </a:cxn>
+              <a:cxn ang="0">
+                <a:pos x="connsiteX6" y="connsiteY6"/>
+              </a:cxn>
+              <a:cxn ang="0">
+                <a:pos x="connsiteX7" y="connsiteY7"/>
+              </a:cxn>
+              <a:cxn ang="0">
+                <a:pos x="connsiteX8" y="connsiteY8"/>
+              </a:cxn>
+              <a:cxn ang="0">
+                <a:pos x="connsiteX9" y="connsiteY9"/>
+              </a:cxn>
+              <a:cxn ang="0">
+                <a:pos x="connsiteX10" y="connsiteY10"/>
+              </a:cxn>
+              <a:cxn ang="0">
+                <a:pos x="connsiteX11" y="connsiteY11"/>
+              </a:cxn>
+              <a:cxn ang="0">
+                <a:pos x="connsiteX12" y="connsiteY12"/>
+              </a:cxn>
+              <a:cxn ang="0">
+                <a:pos x="connsiteX13" y="connsiteY13"/>
+              </a:cxn>
+            </a:cxnLst>
+            <a:rect l="l" t="t" r="r" b="b"/>
+            <a:pathLst>
+              <a:path w="11546828" h="6214534">
+                <a:moveTo>
+                  <a:pt x="0" y="0"/>
+                </a:moveTo>
+                <a:lnTo>
+                  <a:pt x="7965430" y="0"/>
+                </a:lnTo>
+                <a:lnTo>
+                  <a:pt x="7965430" y="1786"/>
+                </a:lnTo>
+                <a:lnTo>
+                  <a:pt x="11546828" y="1786"/>
+                </a:lnTo>
+                <a:lnTo>
+                  <a:pt x="11546828" y="2866740"/>
+                </a:lnTo>
+                <a:lnTo>
+                  <a:pt x="11225095" y="3179536"/>
+                </a:lnTo>
+                <a:lnTo>
+                  <a:pt x="11225095" y="301542"/>
+                </a:lnTo>
+                <a:lnTo>
+                  <a:pt x="320042" y="301542"/>
+                </a:lnTo>
+                <a:lnTo>
+                  <a:pt x="320042" y="5909424"/>
+                </a:lnTo>
+                <a:lnTo>
+                  <a:pt x="8417210" y="5909424"/>
+                </a:lnTo>
+                <a:lnTo>
+                  <a:pt x="8103383" y="6214534"/>
+                </a:lnTo>
+                <a:lnTo>
+                  <a:pt x="7222929" y="6214534"/>
+                </a:lnTo>
+                <a:lnTo>
+                  <a:pt x="7222929" y="6212748"/>
+                </a:lnTo>
+                <a:lnTo>
+                  <a:pt x="0" y="6212748"/>
+                </a:lnTo>
+                <a:close/>
+              </a:path>
+            </a:pathLst>
+          </a:custGeom>
+          <a:solidFill>
+            <a:schemeClr val="tx1">
+              <a:lumMod val="50000"/>
+              <a:lumOff val="50000"/>
+              <a:alpha val="25000"/>
+            </a:schemeClr>
+          </a:solidFill>
+          <a:ln>
+            <a:noFill/>
+          </a:ln>
+        </p:spPr>
+        <p:style>
+          <a:lnRef idx="2">
+            <a:schemeClr val="accent1">
+              <a:shade val="50000"/>
+            </a:schemeClr>
+          </a:lnRef>
+          <a:fillRef idx="1">
+            <a:schemeClr val="accent1"/>
+          </a:fillRef>
+          <a:effectRef idx="0">
+            <a:schemeClr val="accent1"/>
+          </a:effectRef>
+          <a:fontRef idx="minor">
+            <a:schemeClr val="lt1"/>
+          </a:fontRef>
+        </p:style>
+        <p:txBody>
+          <a:bodyPr wrap="square" rtlCol="0" anchor="ctr">
+            <a:noAutofit/>
+          </a:bodyPr>
+          <a:lstStyle/>
+          <a:p>
+            <a:pPr algn="ctr"/>
+            <a:endParaRPr lang="en-US"/>
+          </a:p>
+        </p:txBody>
+      </p:sp>
+      <p:sp>
+        <p:nvSpPr>
+          <p:cNvPr id="1035" name="Right Triangle 1034">
+            <a:extLst>
+              <a:ext uri="{FF2B5EF4-FFF2-40B4-BE49-F238E27FC236}">
+                <a16:creationId xmlns:a16="http://schemas.microsoft.com/office/drawing/2014/main" id="{2AEAFA59-923A-4F54-8B49-44C970BCC323}"/>
+              </a:ext>
+              <a:ext uri="{C183D7F6-B498-43B3-948B-1728B52AA6E4}">
+                <adec:decorative xmlns:adec="http://schemas.microsoft.com/office/drawing/2017/decorative" val="1"/>
+              </a:ext>
+            </a:extLst>
+          </p:cNvPr>
+          <p:cNvSpPr>
+            <a:spLocks noGrp="1" noRot="1" noChangeAspect="1" noMove="1" noResize="1" noEditPoints="1" noAdjustHandles="1" noChangeArrowheads="1" noChangeShapeType="1" noTextEdit="1"/>
+          </p:cNvSpPr>
+          <p:nvPr>
+            <p:extLst>
+              <p:ext uri="{386F3935-93C4-4BCD-93E2-E3B085C9AB24}">
+                <p16:designElem xmlns:p16="http://schemas.microsoft.com/office/powerpoint/2015/main" val="1"/>
+              </p:ext>
+            </p:extLst>
+          </p:nvPr>
+        </p:nvSpPr>
+        <p:spPr>
+          <a:xfrm flipH="1">
+            <a:off x="8576720" y="3335867"/>
+            <a:ext cx="3291840" cy="3200400"/>
+          </a:xfrm>
+          <a:prstGeom prst="rtTriangle">
+            <a:avLst/>
+          </a:prstGeom>
+          <a:solidFill>
+            <a:schemeClr val="accent4"/>
+          </a:solidFill>
+          <a:ln>
+            <a:noFill/>
+          </a:ln>
+        </p:spPr>
+        <p:style>
+          <a:lnRef idx="2">
+            <a:schemeClr val="accent1">
+              <a:shade val="50000"/>
+            </a:schemeClr>
+          </a:lnRef>
+          <a:fillRef idx="1">
+            <a:schemeClr val="accent1"/>
+          </a:fillRef>
+          <a:effectRef idx="0">
+            <a:schemeClr val="accent1"/>
+          </a:effectRef>
+          <a:fontRef idx="minor">
+            <a:schemeClr val="lt1"/>
+          </a:fontRef>
+        </p:style>
+        <p:txBody>
+          <a:bodyPr rtlCol="0" anchor="ctr"/>
+          <a:lstStyle/>
+          <a:p>
+            <a:pPr algn="ctr"/>
+            <a:endParaRPr lang="en-US" dirty="0"/>
+          </a:p>
+        </p:txBody>
+      </p:sp>
+      <p:pic>
+        <p:nvPicPr>
+          <p:cNvPr id="1026" name="Picture 2" descr="‪Any Question&quot; Images – Browse 184 Stock Photos, Vectors, and Video | Adobe  Stock‬‏">
+            <a:extLst>
+              <a:ext uri="{FF2B5EF4-FFF2-40B4-BE49-F238E27FC236}">
+                <a16:creationId xmlns:a16="http://schemas.microsoft.com/office/drawing/2014/main" id="{B1E3333B-8DCA-C2F9-BE55-20FF020542F5}"/>
+              </a:ext>
+            </a:extLst>
+          </p:cNvPr>
+          <p:cNvPicPr>
+            <a:picLocks noChangeAspect="1" noChangeArrowheads="1"/>
+          </p:cNvPicPr>
+          <p:nvPr/>
+        </p:nvPicPr>
+        <p:blipFill>
+          <a:blip r:embed="rId2">
+            <a:extLst>
+              <a:ext uri="{28A0092B-C50C-407E-A947-70E740481C1C}">
+                <a14:useLocalDpi xmlns:a14="http://schemas.microsoft.com/office/drawing/2010/main" val="0"/>
+              </a:ext>
+            </a:extLst>
+          </a:blip>
+          <a:stretch>
+            <a:fillRect/>
+          </a:stretch>
+        </p:blipFill>
+        <p:spPr bwMode="auto">
+          <a:xfrm>
+            <a:off x="1331542" y="918546"/>
+            <a:ext cx="7007951" cy="4979334"/>
+          </a:xfrm>
+          <a:prstGeom prst="rect">
+            <a:avLst/>
+          </a:prstGeom>
+          <a:noFill/>
+          <a:extLst>
+            <a:ext uri="{909E8E84-426E-40DD-AFC4-6F175D3DCCD1}">
+              <a14:hiddenFill xmlns:a14="http://schemas.microsoft.com/office/drawing/2010/main">
+                <a:solidFill>
+                  <a:srgbClr val="FFFFFF"/>
+                </a:solidFill>
+              </a14:hiddenFill>
+            </a:ext>
+          </a:extLst>
+        </p:spPr>
+      </p:pic>
+    </p:spTree>
+    <p:extLst>
+      <p:ext uri="{BB962C8B-B14F-4D97-AF65-F5344CB8AC3E}">
+        <p14:creationId xmlns:p14="http://schemas.microsoft.com/office/powerpoint/2010/main" val="1311421835"/>
       </p:ext>
     </p:extLst>
   </p:cSld>

</xml_diff>